<commit_message>
Added some config stuff
</commit_message>
<xml_diff>
--- a/04-configmaps-und-secrets/deeptalk-04.pptx
+++ b/04-configmaps-und-secrets/deeptalk-04.pptx
@@ -5,46 +5,48 @@
     <p:sldMasterId id="2147483648" r:id="rId1"/>
   </p:sldMasterIdLst>
   <p:notesMasterIdLst>
-    <p:notesMasterId r:id="rId12"/>
+    <p:notesMasterId r:id="rId14"/>
   </p:notesMasterIdLst>
   <p:handoutMasterIdLst>
-    <p:handoutMasterId r:id="rId13"/>
+    <p:handoutMasterId r:id="rId15"/>
   </p:handoutMasterIdLst>
   <p:sldIdLst>
     <p:sldId id="471" r:id="rId2"/>
     <p:sldId id="496" r:id="rId3"/>
     <p:sldId id="497" r:id="rId4"/>
-    <p:sldId id="528" r:id="rId5"/>
-    <p:sldId id="529" r:id="rId6"/>
-    <p:sldId id="530" r:id="rId7"/>
-    <p:sldId id="509" r:id="rId8"/>
-    <p:sldId id="499" r:id="rId9"/>
-    <p:sldId id="508" r:id="rId10"/>
-    <p:sldId id="495" r:id="rId11"/>
+    <p:sldId id="531" r:id="rId5"/>
+    <p:sldId id="532" r:id="rId6"/>
+    <p:sldId id="528" r:id="rId7"/>
+    <p:sldId id="529" r:id="rId8"/>
+    <p:sldId id="530" r:id="rId9"/>
+    <p:sldId id="509" r:id="rId10"/>
+    <p:sldId id="499" r:id="rId11"/>
+    <p:sldId id="508" r:id="rId12"/>
+    <p:sldId id="495" r:id="rId13"/>
   </p:sldIdLst>
   <p:sldSz cx="9144000" cy="5715000" type="screen16x10"/>
   <p:notesSz cx="7099300" cy="10234613"/>
   <p:embeddedFontLst>
     <p:embeddedFont>
       <p:font typeface="Calibri" panose="020F0502020204030204" pitchFamily="34" charset="0"/>
-      <p:regular r:id="rId14"/>
-      <p:bold r:id="rId14"/>
-      <p:italic r:id="rId14"/>
-      <p:boldItalic r:id="rId14"/>
+      <p:regular r:id="rId16"/>
+      <p:bold r:id="rId16"/>
+      <p:italic r:id="rId16"/>
+      <p:boldItalic r:id="rId16"/>
     </p:embeddedFont>
     <p:embeddedFont>
       <p:font typeface="Helvetica" pitchFamily="2" charset="0"/>
-      <p:regular r:id="rId14"/>
-      <p:bold r:id="rId14"/>
-      <p:italic r:id="rId14"/>
-      <p:boldItalic r:id="rId14"/>
+      <p:regular r:id="rId16"/>
+      <p:bold r:id="rId16"/>
+      <p:italic r:id="rId16"/>
+      <p:boldItalic r:id="rId16"/>
     </p:embeddedFont>
     <p:embeddedFont>
       <p:font typeface="Verdana" panose="020B0604030504040204" pitchFamily="34" charset="0"/>
-      <p:regular r:id="rId14"/>
-      <p:bold r:id="rId14"/>
-      <p:italic r:id="rId14"/>
-      <p:boldItalic r:id="rId14"/>
+      <p:regular r:id="rId16"/>
+      <p:bold r:id="rId16"/>
+      <p:italic r:id="rId16"/>
+      <p:boldItalic r:id="rId16"/>
     </p:embeddedFont>
   </p:embeddedFontLst>
   <p:defaultTextStyle>
@@ -1201,7 +1203,7 @@
     </p:spTree>
     <p:extLst>
       <p:ext uri="{BB962C8B-B14F-4D97-AF65-F5344CB8AC3E}">
-        <p14:creationId xmlns:p14="http://schemas.microsoft.com/office/powerpoint/2010/main" val="4110080689"/>
+        <p14:creationId xmlns:p14="http://schemas.microsoft.com/office/powerpoint/2010/main" val="1656368060"/>
       </p:ext>
     </p:extLst>
   </p:cSld>
@@ -1297,7 +1299,7 @@
     </p:spTree>
     <p:extLst>
       <p:ext uri="{BB962C8B-B14F-4D97-AF65-F5344CB8AC3E}">
-        <p14:creationId xmlns:p14="http://schemas.microsoft.com/office/powerpoint/2010/main" val="478657989"/>
+        <p14:creationId xmlns:p14="http://schemas.microsoft.com/office/powerpoint/2010/main" val="1247623124"/>
       </p:ext>
     </p:extLst>
   </p:cSld>
@@ -1393,7 +1395,7 @@
     </p:spTree>
     <p:extLst>
       <p:ext uri="{BB962C8B-B14F-4D97-AF65-F5344CB8AC3E}">
-        <p14:creationId xmlns:p14="http://schemas.microsoft.com/office/powerpoint/2010/main" val="1988012244"/>
+        <p14:creationId xmlns:p14="http://schemas.microsoft.com/office/powerpoint/2010/main" val="4110080689"/>
       </p:ext>
     </p:extLst>
   </p:cSld>
@@ -1489,7 +1491,7 @@
     </p:spTree>
     <p:extLst>
       <p:ext uri="{BB962C8B-B14F-4D97-AF65-F5344CB8AC3E}">
-        <p14:creationId xmlns:p14="http://schemas.microsoft.com/office/powerpoint/2010/main" val="1492651428"/>
+        <p14:creationId xmlns:p14="http://schemas.microsoft.com/office/powerpoint/2010/main" val="478657989"/>
       </p:ext>
     </p:extLst>
   </p:cSld>
@@ -1577,6 +1579,198 @@
                 <a:defRPr/>
               </a:pPr>
               <a:t>8</a:t>
+            </a:fld>
+            <a:endParaRPr lang="de-DE"/>
+          </a:p>
+        </p:txBody>
+      </p:sp>
+    </p:spTree>
+    <p:extLst>
+      <p:ext uri="{BB962C8B-B14F-4D97-AF65-F5344CB8AC3E}">
+        <p14:creationId xmlns:p14="http://schemas.microsoft.com/office/powerpoint/2010/main" val="1988012244"/>
+      </p:ext>
+    </p:extLst>
+  </p:cSld>
+  <p:clrMapOvr>
+    <a:masterClrMapping/>
+  </p:clrMapOvr>
+</p:notes>
+</file>
+
+<file path=ppt/notesSlides/notesSlide8.xml><?xml version="1.0" encoding="utf-8"?>
+<p:notes xmlns:a="http://schemas.openxmlformats.org/drawingml/2006/main" xmlns:r="http://schemas.openxmlformats.org/officeDocument/2006/relationships" xmlns:p="http://schemas.openxmlformats.org/presentationml/2006/main">
+  <p:cSld>
+    <p:spTree>
+      <p:nvGrpSpPr>
+        <p:cNvPr id="1" name=""/>
+        <p:cNvGrpSpPr/>
+        <p:nvPr/>
+      </p:nvGrpSpPr>
+      <p:grpSpPr>
+        <a:xfrm>
+          <a:off x="0" y="0"/>
+          <a:ext cx="0" cy="0"/>
+          <a:chOff x="0" y="0"/>
+          <a:chExt cx="0" cy="0"/>
+        </a:xfrm>
+      </p:grpSpPr>
+      <p:sp>
+        <p:nvSpPr>
+          <p:cNvPr id="2" name="Folienbildplatzhalter 1"/>
+          <p:cNvSpPr>
+            <a:spLocks noGrp="1" noRot="1" noChangeAspect="1"/>
+          </p:cNvSpPr>
+          <p:nvPr>
+            <p:ph type="sldImg"/>
+          </p:nvPr>
+        </p:nvSpPr>
+        <p:spPr/>
+      </p:sp>
+      <p:sp>
+        <p:nvSpPr>
+          <p:cNvPr id="3" name="Notizenplatzhalter 2"/>
+          <p:cNvSpPr>
+            <a:spLocks noGrp="1"/>
+          </p:cNvSpPr>
+          <p:nvPr>
+            <p:ph type="body" idx="1"/>
+          </p:nvPr>
+        </p:nvSpPr>
+        <p:spPr/>
+        <p:txBody>
+          <a:bodyPr/>
+          <a:lstStyle/>
+          <a:p>
+            <a:r>
+              <a:rPr lang="de-DE" dirty="0">
+                <a:hlinkClick r:id="rId3"/>
+              </a:rPr>
+              <a:t>https://www.docker.com/resources/what-container</a:t>
+            </a:r>
+            <a:endParaRPr lang="de-DE" dirty="0"/>
+          </a:p>
+        </p:txBody>
+      </p:sp>
+      <p:sp>
+        <p:nvSpPr>
+          <p:cNvPr id="4" name="Foliennummernplatzhalter 3"/>
+          <p:cNvSpPr>
+            <a:spLocks noGrp="1"/>
+          </p:cNvSpPr>
+          <p:nvPr>
+            <p:ph type="sldNum" sz="quarter" idx="5"/>
+          </p:nvPr>
+        </p:nvSpPr>
+        <p:spPr/>
+        <p:txBody>
+          <a:bodyPr/>
+          <a:lstStyle/>
+          <a:p>
+            <a:pPr>
+              <a:defRPr/>
+            </a:pPr>
+            <a:fld id="{4D8C3D32-0CEC-4E75-98FF-2FBD233904A7}" type="slidenum">
+              <a:rPr lang="de-DE" smtClean="0"/>
+              <a:pPr>
+                <a:defRPr/>
+              </a:pPr>
+              <a:t>9</a:t>
+            </a:fld>
+            <a:endParaRPr lang="de-DE"/>
+          </a:p>
+        </p:txBody>
+      </p:sp>
+    </p:spTree>
+    <p:extLst>
+      <p:ext uri="{BB962C8B-B14F-4D97-AF65-F5344CB8AC3E}">
+        <p14:creationId xmlns:p14="http://schemas.microsoft.com/office/powerpoint/2010/main" val="1492651428"/>
+      </p:ext>
+    </p:extLst>
+  </p:cSld>
+  <p:clrMapOvr>
+    <a:masterClrMapping/>
+  </p:clrMapOvr>
+</p:notes>
+</file>
+
+<file path=ppt/notesSlides/notesSlide9.xml><?xml version="1.0" encoding="utf-8"?>
+<p:notes xmlns:a="http://schemas.openxmlformats.org/drawingml/2006/main" xmlns:r="http://schemas.openxmlformats.org/officeDocument/2006/relationships" xmlns:p="http://schemas.openxmlformats.org/presentationml/2006/main">
+  <p:cSld>
+    <p:spTree>
+      <p:nvGrpSpPr>
+        <p:cNvPr id="1" name=""/>
+        <p:cNvGrpSpPr/>
+        <p:nvPr/>
+      </p:nvGrpSpPr>
+      <p:grpSpPr>
+        <a:xfrm>
+          <a:off x="0" y="0"/>
+          <a:ext cx="0" cy="0"/>
+          <a:chOff x="0" y="0"/>
+          <a:chExt cx="0" cy="0"/>
+        </a:xfrm>
+      </p:grpSpPr>
+      <p:sp>
+        <p:nvSpPr>
+          <p:cNvPr id="2" name="Folienbildplatzhalter 1"/>
+          <p:cNvSpPr>
+            <a:spLocks noGrp="1" noRot="1" noChangeAspect="1"/>
+          </p:cNvSpPr>
+          <p:nvPr>
+            <p:ph type="sldImg"/>
+          </p:nvPr>
+        </p:nvSpPr>
+        <p:spPr/>
+      </p:sp>
+      <p:sp>
+        <p:nvSpPr>
+          <p:cNvPr id="3" name="Notizenplatzhalter 2"/>
+          <p:cNvSpPr>
+            <a:spLocks noGrp="1"/>
+          </p:cNvSpPr>
+          <p:nvPr>
+            <p:ph type="body" idx="1"/>
+          </p:nvPr>
+        </p:nvSpPr>
+        <p:spPr/>
+        <p:txBody>
+          <a:bodyPr/>
+          <a:lstStyle/>
+          <a:p>
+            <a:r>
+              <a:rPr lang="de-DE" dirty="0">
+                <a:hlinkClick r:id="rId3"/>
+              </a:rPr>
+              <a:t>https://www.docker.com/resources/what-container</a:t>
+            </a:r>
+            <a:endParaRPr lang="de-DE" dirty="0"/>
+          </a:p>
+        </p:txBody>
+      </p:sp>
+      <p:sp>
+        <p:nvSpPr>
+          <p:cNvPr id="4" name="Foliennummernplatzhalter 3"/>
+          <p:cNvSpPr>
+            <a:spLocks noGrp="1"/>
+          </p:cNvSpPr>
+          <p:nvPr>
+            <p:ph type="sldNum" sz="quarter" idx="5"/>
+          </p:nvPr>
+        </p:nvSpPr>
+        <p:spPr/>
+        <p:txBody>
+          <a:bodyPr/>
+          <a:lstStyle/>
+          <a:p>
+            <a:pPr>
+              <a:defRPr/>
+            </a:pPr>
+            <a:fld id="{4D8C3D32-0CEC-4E75-98FF-2FBD233904A7}" type="slidenum">
+              <a:rPr lang="de-DE" smtClean="0"/>
+              <a:pPr>
+                <a:defRPr/>
+              </a:pPr>
+              <a:t>10</a:t>
             </a:fld>
             <a:endParaRPr lang="de-DE"/>
           </a:p>
@@ -4400,6 +4594,366 @@
           <p:cNvPr id="2" name="Titel 1">
             <a:extLst>
               <a:ext uri="{FF2B5EF4-FFF2-40B4-BE49-F238E27FC236}">
+                <a16:creationId xmlns:a16="http://schemas.microsoft.com/office/drawing/2014/main" id="{63E74088-BB91-574B-9695-A0121785026E}"/>
+              </a:ext>
+            </a:extLst>
+          </p:cNvPr>
+          <p:cNvSpPr>
+            <a:spLocks noGrp="1"/>
+          </p:cNvSpPr>
+          <p:nvPr>
+            <p:ph type="title"/>
+          </p:nvPr>
+        </p:nvSpPr>
+        <p:spPr/>
+        <p:txBody>
+          <a:bodyPr/>
+          <a:lstStyle/>
+          <a:p>
+            <a:r>
+              <a:rPr lang="de-DE" dirty="0" err="1"/>
+              <a:t>Misc</a:t>
+            </a:r>
+            <a:endParaRPr lang="de-DE" dirty="0"/>
+          </a:p>
+        </p:txBody>
+      </p:sp>
+      <p:sp>
+        <p:nvSpPr>
+          <p:cNvPr id="3" name="Inhaltsplatzhalter 2">
+            <a:extLst>
+              <a:ext uri="{FF2B5EF4-FFF2-40B4-BE49-F238E27FC236}">
+                <a16:creationId xmlns:a16="http://schemas.microsoft.com/office/drawing/2014/main" id="{0EEB0F87-B7B4-B946-A3AA-B4CFBE864340}"/>
+              </a:ext>
+            </a:extLst>
+          </p:cNvPr>
+          <p:cNvSpPr>
+            <a:spLocks noGrp="1"/>
+          </p:cNvSpPr>
+          <p:nvPr>
+            <p:ph idx="1"/>
+          </p:nvPr>
+        </p:nvSpPr>
+        <p:spPr/>
+        <p:txBody>
+          <a:bodyPr>
+            <a:normAutofit fontScale="85000" lnSpcReduction="20000"/>
+          </a:bodyPr>
+          <a:lstStyle/>
+          <a:p>
+            <a:r>
+              <a:rPr lang="de-DE" b="1" dirty="0"/>
+              <a:t>Materialien zum Talk</a:t>
+            </a:r>
+          </a:p>
+          <a:p>
+            <a:r>
+              <a:rPr lang="de-DE" dirty="0">
+                <a:hlinkClick r:id="rId3"/>
+              </a:rPr>
+              <a:t>https://github.com/grothesk/deeptalk</a:t>
+            </a:r>
+            <a:endParaRPr lang="de-DE" dirty="0"/>
+          </a:p>
+          <a:p>
+            <a:endParaRPr lang="de-DE" dirty="0"/>
+          </a:p>
+          <a:p>
+            <a:r>
+              <a:rPr lang="de-DE" b="1" dirty="0"/>
+              <a:t>Weiterführendes</a:t>
+            </a:r>
+          </a:p>
+          <a:p>
+            <a:r>
+              <a:rPr lang="de-DE" dirty="0" err="1"/>
+              <a:t>Celery</a:t>
+            </a:r>
+            <a:r>
+              <a:rPr lang="de-DE" dirty="0"/>
+              <a:t> </a:t>
+            </a:r>
+            <a:r>
+              <a:rPr lang="de-DE" dirty="0">
+                <a:sym typeface="Wingdings" pitchFamily="2" charset="2"/>
+              </a:rPr>
+              <a:t> </a:t>
+            </a:r>
+            <a:r>
+              <a:rPr lang="de-DE" dirty="0"/>
+              <a:t>Asynchron in Python: </a:t>
+            </a:r>
+            <a:r>
+              <a:rPr lang="de-DE" dirty="0">
+                <a:hlinkClick r:id="rId4"/>
+              </a:rPr>
+              <a:t>https://docs.celeryproject.org</a:t>
+            </a:r>
+            <a:endParaRPr lang="de-DE" dirty="0"/>
+          </a:p>
+          <a:p>
+            <a:r>
+              <a:rPr lang="de-DE" dirty="0"/>
+              <a:t>Django </a:t>
+            </a:r>
+            <a:r>
+              <a:rPr lang="de-DE" dirty="0">
+                <a:sym typeface="Wingdings" pitchFamily="2" charset="2"/>
+              </a:rPr>
+              <a:t> Alternative zu </a:t>
+            </a:r>
+            <a:r>
+              <a:rPr lang="de-DE" dirty="0" err="1">
+                <a:sym typeface="Wingdings" pitchFamily="2" charset="2"/>
+              </a:rPr>
+              <a:t>Flask</a:t>
+            </a:r>
+            <a:r>
+              <a:rPr lang="de-DE" dirty="0">
+                <a:sym typeface="Wingdings" pitchFamily="2" charset="2"/>
+              </a:rPr>
+              <a:t>: </a:t>
+            </a:r>
+            <a:r>
+              <a:rPr lang="de-DE" dirty="0">
+                <a:hlinkClick r:id="rId5"/>
+              </a:rPr>
+              <a:t>https://www.djangoproject.com</a:t>
+            </a:r>
+            <a:endParaRPr lang="de-DE" dirty="0"/>
+          </a:p>
+          <a:p>
+            <a:r>
+              <a:rPr lang="de-DE" dirty="0" err="1"/>
+              <a:t>Skaffold</a:t>
+            </a:r>
+            <a:r>
+              <a:rPr lang="de-DE" dirty="0"/>
+              <a:t> </a:t>
+            </a:r>
+            <a:r>
+              <a:rPr lang="de-DE" dirty="0">
+                <a:sym typeface="Wingdings" pitchFamily="2" charset="2"/>
+              </a:rPr>
+              <a:t> Entwicklung von k8s-Anwendungen: </a:t>
+            </a:r>
+            <a:r>
+              <a:rPr lang="de-DE" dirty="0">
+                <a:hlinkClick r:id="rId6"/>
+              </a:rPr>
+              <a:t>https://skaffold.dev</a:t>
+            </a:r>
+            <a:endParaRPr lang="de-DE" dirty="0"/>
+          </a:p>
+          <a:p>
+            <a:endParaRPr lang="de-DE" dirty="0"/>
+          </a:p>
+          <a:p>
+            <a:r>
+              <a:rPr lang="de-DE" b="1" dirty="0"/>
+              <a:t>Feedback , Anregungen, Themenvorschläge</a:t>
+            </a:r>
+          </a:p>
+          <a:p>
+            <a:r>
+              <a:rPr lang="de-DE" dirty="0">
+                <a:hlinkClick r:id="rId7"/>
+              </a:rPr>
+              <a:t>florian.boldt@deepshore.de</a:t>
+            </a:r>
+            <a:endParaRPr lang="de-DE" dirty="0"/>
+          </a:p>
+          <a:p>
+            <a:r>
+              <a:rPr lang="de-DE" dirty="0">
+                <a:hlinkClick r:id="rId8"/>
+              </a:rPr>
+              <a:t>malte.groth@deepshore.de</a:t>
+            </a:r>
+            <a:endParaRPr lang="de-DE" dirty="0"/>
+          </a:p>
+          <a:p>
+            <a:r>
+              <a:rPr lang="de-DE" dirty="0">
+                <a:hlinkClick r:id="rId9"/>
+              </a:rPr>
+              <a:t>frederic.born@deepshore.de</a:t>
+            </a:r>
+            <a:endParaRPr lang="de-DE" dirty="0"/>
+          </a:p>
+          <a:p>
+            <a:endParaRPr lang="de-DE" dirty="0"/>
+          </a:p>
+          <a:p>
+            <a:endParaRPr lang="de-DE" dirty="0"/>
+          </a:p>
+          <a:p>
+            <a:endParaRPr lang="de-DE" dirty="0"/>
+          </a:p>
+        </p:txBody>
+      </p:sp>
+    </p:spTree>
+    <p:extLst>
+      <p:ext uri="{BB962C8B-B14F-4D97-AF65-F5344CB8AC3E}">
+        <p14:creationId xmlns:p14="http://schemas.microsoft.com/office/powerpoint/2010/main" val="1579135088"/>
+      </p:ext>
+    </p:extLst>
+  </p:cSld>
+  <p:clrMapOvr>
+    <a:masterClrMapping/>
+  </p:clrMapOvr>
+</p:sld>
+</file>
+
+<file path=ppt/slides/slide11.xml><?xml version="1.0" encoding="utf-8"?>
+<p:sld xmlns:a="http://schemas.openxmlformats.org/drawingml/2006/main" xmlns:r="http://schemas.openxmlformats.org/officeDocument/2006/relationships" xmlns:p="http://schemas.openxmlformats.org/presentationml/2006/main">
+  <p:cSld>
+    <p:spTree>
+      <p:nvGrpSpPr>
+        <p:cNvPr id="1" name=""/>
+        <p:cNvGrpSpPr/>
+        <p:nvPr/>
+      </p:nvGrpSpPr>
+      <p:grpSpPr>
+        <a:xfrm>
+          <a:off x="0" y="0"/>
+          <a:ext cx="0" cy="0"/>
+          <a:chOff x="0" y="0"/>
+          <a:chExt cx="0" cy="0"/>
+        </a:xfrm>
+      </p:grpSpPr>
+      <p:sp>
+        <p:nvSpPr>
+          <p:cNvPr id="2" name="Titel 1">
+            <a:extLst>
+              <a:ext uri="{FF2B5EF4-FFF2-40B4-BE49-F238E27FC236}">
+                <a16:creationId xmlns:a16="http://schemas.microsoft.com/office/drawing/2014/main" id="{693F10F7-6A72-7443-9D29-766F88D4FE7E}"/>
+              </a:ext>
+            </a:extLst>
+          </p:cNvPr>
+          <p:cNvSpPr>
+            <a:spLocks noGrp="1"/>
+          </p:cNvSpPr>
+          <p:nvPr>
+            <p:ph type="title"/>
+          </p:nvPr>
+        </p:nvSpPr>
+        <p:spPr/>
+        <p:txBody>
+          <a:bodyPr/>
+          <a:lstStyle/>
+          <a:p>
+            <a:r>
+              <a:rPr lang="de-DE" dirty="0"/>
+              <a:t>Ausblick</a:t>
+            </a:r>
+          </a:p>
+        </p:txBody>
+      </p:sp>
+      <p:sp>
+        <p:nvSpPr>
+          <p:cNvPr id="3" name="Inhaltsplatzhalter 2">
+            <a:extLst>
+              <a:ext uri="{FF2B5EF4-FFF2-40B4-BE49-F238E27FC236}">
+                <a16:creationId xmlns:a16="http://schemas.microsoft.com/office/drawing/2014/main" id="{86FD58D8-14F3-0B49-A927-BE31094219CF}"/>
+              </a:ext>
+            </a:extLst>
+          </p:cNvPr>
+          <p:cNvSpPr>
+            <a:spLocks noGrp="1"/>
+          </p:cNvSpPr>
+          <p:nvPr>
+            <p:ph idx="1"/>
+          </p:nvPr>
+        </p:nvSpPr>
+        <p:spPr/>
+        <p:txBody>
+          <a:bodyPr/>
+          <a:lstStyle/>
+          <a:p>
+            <a:pPr marL="360">
+              <a:spcBef>
+                <a:spcPts val="799"/>
+              </a:spcBef>
+            </a:pPr>
+            <a:r>
+              <a:rPr lang="de-DE" spc="-1" dirty="0">
+                <a:solidFill>
+                  <a:srgbClr val="000000"/>
+                </a:solidFill>
+                <a:latin typeface="Verdana"/>
+              </a:rPr>
+              <a:t>Persistenz in </a:t>
+            </a:r>
+            <a:r>
+              <a:rPr lang="de-DE" spc="-1" dirty="0" err="1">
+                <a:solidFill>
+                  <a:srgbClr val="000000"/>
+                </a:solidFill>
+                <a:latin typeface="Verdana"/>
+              </a:rPr>
+              <a:t>Kubernetes</a:t>
+            </a:r>
+            <a:r>
+              <a:rPr lang="de-DE" spc="-1" dirty="0">
+                <a:solidFill>
+                  <a:srgbClr val="000000"/>
+                </a:solidFill>
+                <a:latin typeface="Verdana"/>
+              </a:rPr>
+              <a:t>:</a:t>
+            </a:r>
+          </a:p>
+          <a:p>
+            <a:pPr marL="360">
+              <a:spcBef>
+                <a:spcPts val="799"/>
+              </a:spcBef>
+            </a:pPr>
+            <a:endParaRPr lang="de-DE" spc="-1" dirty="0">
+              <a:solidFill>
+                <a:srgbClr val="000000"/>
+              </a:solidFill>
+              <a:latin typeface="Verdana"/>
+            </a:endParaRPr>
+          </a:p>
+        </p:txBody>
+      </p:sp>
+    </p:spTree>
+    <p:extLst>
+      <p:ext uri="{BB962C8B-B14F-4D97-AF65-F5344CB8AC3E}">
+        <p14:creationId xmlns:p14="http://schemas.microsoft.com/office/powerpoint/2010/main" val="1036390888"/>
+      </p:ext>
+    </p:extLst>
+  </p:cSld>
+  <p:clrMapOvr>
+    <a:masterClrMapping/>
+  </p:clrMapOvr>
+</p:sld>
+</file>
+
+<file path=ppt/slides/slide12.xml><?xml version="1.0" encoding="utf-8"?>
+<p:sld xmlns:a="http://schemas.openxmlformats.org/drawingml/2006/main" xmlns:r="http://schemas.openxmlformats.org/officeDocument/2006/relationships" xmlns:p="http://schemas.openxmlformats.org/presentationml/2006/main">
+  <p:cSld>
+    <p:spTree>
+      <p:nvGrpSpPr>
+        <p:cNvPr id="1" name=""/>
+        <p:cNvGrpSpPr/>
+        <p:nvPr/>
+      </p:nvGrpSpPr>
+      <p:grpSpPr>
+        <a:xfrm>
+          <a:off x="0" y="0"/>
+          <a:ext cx="0" cy="0"/>
+          <a:chOff x="0" y="0"/>
+          <a:chExt cx="0" cy="0"/>
+        </a:xfrm>
+      </p:grpSpPr>
+      <p:sp>
+        <p:nvSpPr>
+          <p:cNvPr id="2" name="Titel 1">
+            <a:extLst>
+              <a:ext uri="{FF2B5EF4-FFF2-40B4-BE49-F238E27FC236}">
                 <a16:creationId xmlns:a16="http://schemas.microsoft.com/office/drawing/2014/main" id="{AB86CD89-439C-2346-8F13-A8BE9C864884}"/>
               </a:ext>
             </a:extLst>
@@ -4543,7 +5097,7 @@
           <a:p>
             <a:r>
               <a:rPr lang="de-DE" dirty="0"/>
-              <a:t>Anwendung</a:t>
+              <a:t>Beispiele aus der Praxis</a:t>
             </a:r>
           </a:p>
           <a:p>
@@ -4780,11 +5334,11 @@
           <a:p>
             <a:r>
               <a:rPr lang="de-DE" dirty="0" err="1"/>
-              <a:t>ConfigMaps</a:t>
+              <a:t>Grafana</a:t>
             </a:r>
             <a:r>
               <a:rPr lang="de-DE" dirty="0"/>
-              <a:t> erzeugen</a:t>
+              <a:t> konfigurieren</a:t>
             </a:r>
           </a:p>
         </p:txBody>
@@ -4813,80 +5367,8 @@
           <a:lstStyle/>
           <a:p>
             <a:r>
-              <a:rPr lang="de-DE" b="1" dirty="0" err="1"/>
-              <a:t>kubectl</a:t>
-            </a:r>
-            <a:r>
-              <a:rPr lang="de-DE" b="1" dirty="0"/>
-              <a:t> </a:t>
-            </a:r>
-            <a:r>
-              <a:rPr lang="de-DE" b="1" dirty="0" err="1"/>
-              <a:t>create</a:t>
-            </a:r>
-            <a:r>
-              <a:rPr lang="de-DE" b="1" dirty="0"/>
-              <a:t> </a:t>
-            </a:r>
-            <a:r>
-              <a:rPr lang="de-DE" b="1" dirty="0" err="1"/>
-              <a:t>configmap</a:t>
-            </a:r>
-            <a:endParaRPr lang="de-DE" b="1" dirty="0"/>
-          </a:p>
-          <a:p>
-            <a:pPr marL="285750" indent="-285750">
-              <a:buFont typeface="Arial" panose="020B0604020202020204" pitchFamily="34" charset="0"/>
-              <a:buChar char="•"/>
-            </a:pPr>
-            <a:r>
               <a:rPr lang="de-DE" dirty="0" err="1"/>
-              <a:t>Literals</a:t>
-            </a:r>
-            <a:endParaRPr lang="de-DE" dirty="0"/>
-          </a:p>
-          <a:p>
-            <a:pPr marL="285750" indent="-285750">
-              <a:buFont typeface="Arial" panose="020B0604020202020204" pitchFamily="34" charset="0"/>
-              <a:buChar char="•"/>
-            </a:pPr>
-            <a:r>
-              <a:rPr lang="de-DE" dirty="0"/>
-              <a:t>Files</a:t>
-            </a:r>
-          </a:p>
-          <a:p>
-            <a:pPr marL="285750" indent="-285750">
-              <a:buFont typeface="Arial" panose="020B0604020202020204" pitchFamily="34" charset="0"/>
-              <a:buChar char="•"/>
-            </a:pPr>
-            <a:r>
-              <a:rPr lang="de-DE" dirty="0" err="1"/>
-              <a:t>Directories</a:t>
-            </a:r>
-            <a:endParaRPr lang="de-DE" dirty="0"/>
-          </a:p>
-          <a:p>
-            <a:pPr marL="285750" indent="-285750">
-              <a:buFont typeface="Arial" panose="020B0604020202020204" pitchFamily="34" charset="0"/>
-              <a:buChar char="•"/>
-            </a:pPr>
-            <a:endParaRPr lang="de-DE" dirty="0"/>
-          </a:p>
-          <a:p>
-            <a:r>
-              <a:rPr lang="de-DE" b="1" dirty="0"/>
-              <a:t>Generatoren</a:t>
-            </a:r>
-          </a:p>
-          <a:p>
-            <a:pPr marL="285750" indent="-285750">
-              <a:buFont typeface="Arial" panose="020B0604020202020204" pitchFamily="34" charset="0"/>
-              <a:buChar char="•"/>
-            </a:pPr>
-            <a:r>
-              <a:rPr lang="de-DE" dirty="0" err="1"/>
-              <a:t>kustomization.yaml</a:t>
+              <a:t>Blablabla</a:t>
             </a:r>
             <a:endParaRPr lang="de-DE" dirty="0"/>
           </a:p>
@@ -4895,7 +5377,7 @@
     </p:spTree>
     <p:extLst>
       <p:ext uri="{BB962C8B-B14F-4D97-AF65-F5344CB8AC3E}">
-        <p14:creationId xmlns:p14="http://schemas.microsoft.com/office/powerpoint/2010/main" val="1015194288"/>
+        <p14:creationId xmlns:p14="http://schemas.microsoft.com/office/powerpoint/2010/main" val="3223301392"/>
       </p:ext>
     </p:extLst>
   </p:cSld>
@@ -4945,12 +5427,17 @@
           <a:p>
             <a:r>
               <a:rPr lang="de-DE" dirty="0" err="1"/>
-              <a:t>Secrets</a:t>
+              <a:t>ConfigMap</a:t>
             </a:r>
             <a:r>
               <a:rPr lang="de-DE" dirty="0"/>
-              <a:t> erzeugen</a:t>
-            </a:r>
+              <a:t> </a:t>
+            </a:r>
+            <a:r>
+              <a:rPr lang="de-DE" dirty="0" err="1"/>
+              <a:t>mounten</a:t>
+            </a:r>
+            <a:endParaRPr lang="de-DE" dirty="0"/>
           </a:p>
         </p:txBody>
       </p:sp>
@@ -4978,82 +5465,9 @@
           <a:lstStyle/>
           <a:p>
             <a:r>
-              <a:rPr lang="de-DE" b="1" dirty="0"/>
-              <a:t>siehe </a:t>
-            </a:r>
-            <a:r>
-              <a:rPr lang="de-DE" b="1" dirty="0" err="1"/>
-              <a:t>ConfigMaps</a:t>
-            </a:r>
-            <a:endParaRPr lang="de-DE" b="1" dirty="0"/>
-          </a:p>
-          <a:p>
-            <a:endParaRPr lang="de-DE" b="1" dirty="0"/>
-          </a:p>
-          <a:p>
-            <a:r>
-              <a:rPr lang="de-DE" b="1" dirty="0" err="1"/>
-              <a:t>kubectl</a:t>
-            </a:r>
-            <a:r>
-              <a:rPr lang="de-DE" b="1" dirty="0"/>
-              <a:t> </a:t>
-            </a:r>
-            <a:r>
-              <a:rPr lang="de-DE" b="1" dirty="0" err="1"/>
-              <a:t>create</a:t>
-            </a:r>
-            <a:r>
-              <a:rPr lang="de-DE" b="1" dirty="0"/>
-              <a:t> </a:t>
-            </a:r>
-            <a:r>
-              <a:rPr lang="de-DE" b="1" dirty="0" err="1"/>
-              <a:t>secret</a:t>
-            </a:r>
-            <a:r>
-              <a:rPr lang="de-DE" b="1" dirty="0"/>
-              <a:t> &lt;type&gt;</a:t>
-            </a:r>
-          </a:p>
-          <a:p>
-            <a:pPr marL="285750" indent="-285750">
-              <a:buFont typeface="Arial" panose="020B0604020202020204" pitchFamily="34" charset="0"/>
-              <a:buChar char="•"/>
-            </a:pPr>
-            <a:r>
               <a:rPr lang="de-DE" dirty="0" err="1"/>
-              <a:t>generic</a:t>
-            </a:r>
-            <a:endParaRPr lang="de-DE" dirty="0"/>
-          </a:p>
-          <a:p>
-            <a:pPr marL="285750" indent="-285750">
-              <a:buFont typeface="Arial" panose="020B0604020202020204" pitchFamily="34" charset="0"/>
-              <a:buChar char="•"/>
-            </a:pPr>
-            <a:r>
-              <a:rPr lang="de-DE" dirty="0" err="1"/>
-              <a:t>tls</a:t>
-            </a:r>
-            <a:endParaRPr lang="de-DE" dirty="0"/>
-          </a:p>
-          <a:p>
-            <a:pPr marL="285750" indent="-285750">
-              <a:buFont typeface="Arial" panose="020B0604020202020204" pitchFamily="34" charset="0"/>
-              <a:buChar char="•"/>
-            </a:pPr>
-            <a:r>
-              <a:rPr lang="de-DE" dirty="0" err="1"/>
-              <a:t>docker-registry</a:t>
-            </a:r>
-            <a:endParaRPr lang="de-DE" dirty="0"/>
-          </a:p>
-          <a:p>
-            <a:pPr marL="285750" indent="-285750">
-              <a:buFont typeface="Arial" panose="020B0604020202020204" pitchFamily="34" charset="0"/>
-              <a:buChar char="•"/>
-            </a:pPr>
+              <a:t>Blablabla</a:t>
+            </a:r>
             <a:endParaRPr lang="de-DE" dirty="0"/>
           </a:p>
         </p:txBody>
@@ -5061,7 +5475,7 @@
     </p:spTree>
     <p:extLst>
       <p:ext uri="{BB962C8B-B14F-4D97-AF65-F5344CB8AC3E}">
-        <p14:creationId xmlns:p14="http://schemas.microsoft.com/office/powerpoint/2010/main" val="2398007689"/>
+        <p14:creationId xmlns:p14="http://schemas.microsoft.com/office/powerpoint/2010/main" val="3933550168"/>
       </p:ext>
     </p:extLst>
   </p:cSld>
@@ -5110,14 +5524,13 @@
           <a:lstStyle/>
           <a:p>
             <a:r>
+              <a:rPr lang="de-DE" dirty="0" err="1"/>
+              <a:t>ConfigMaps</a:t>
+            </a:r>
+            <a:r>
               <a:rPr lang="de-DE" dirty="0"/>
-              <a:t>Umgang mit </a:t>
-            </a:r>
-            <a:r>
-              <a:rPr lang="de-DE" dirty="0" err="1"/>
-              <a:t>Secrets</a:t>
-            </a:r>
-            <a:endParaRPr lang="de-DE" dirty="0"/>
+              <a:t> erzeugen</a:t>
+            </a:r>
           </a:p>
         </p:txBody>
       </p:sp>
@@ -5144,18 +5557,90 @@
           </a:bodyPr>
           <a:lstStyle/>
           <a:p>
+            <a:r>
+              <a:rPr lang="de-DE" b="1" dirty="0" err="1"/>
+              <a:t>kubectl</a:t>
+            </a:r>
+            <a:r>
+              <a:rPr lang="de-DE" b="1" dirty="0"/>
+              <a:t> </a:t>
+            </a:r>
+            <a:r>
+              <a:rPr lang="de-DE" b="1" dirty="0" err="1"/>
+              <a:t>create</a:t>
+            </a:r>
+            <a:r>
+              <a:rPr lang="de-DE" b="1" dirty="0"/>
+              <a:t> </a:t>
+            </a:r>
+            <a:r>
+              <a:rPr lang="de-DE" b="1" dirty="0" err="1"/>
+              <a:t>configmap</a:t>
+            </a:r>
+            <a:endParaRPr lang="de-DE" b="1" dirty="0"/>
+          </a:p>
+          <a:p>
+            <a:pPr marL="285750" indent="-285750">
+              <a:buFont typeface="Arial" panose="020B0604020202020204" pitchFamily="34" charset="0"/>
+              <a:buChar char="•"/>
+            </a:pPr>
+            <a:r>
+              <a:rPr lang="de-DE" dirty="0" err="1"/>
+              <a:t>Literals</a:t>
+            </a:r>
+            <a:endParaRPr lang="de-DE" dirty="0"/>
+          </a:p>
+          <a:p>
+            <a:pPr marL="285750" indent="-285750">
+              <a:buFont typeface="Arial" panose="020B0604020202020204" pitchFamily="34" charset="0"/>
+              <a:buChar char="•"/>
+            </a:pPr>
+            <a:r>
+              <a:rPr lang="de-DE" dirty="0"/>
+              <a:t>Files</a:t>
+            </a:r>
+          </a:p>
+          <a:p>
+            <a:pPr marL="285750" indent="-285750">
+              <a:buFont typeface="Arial" panose="020B0604020202020204" pitchFamily="34" charset="0"/>
+              <a:buChar char="•"/>
+            </a:pPr>
+            <a:r>
+              <a:rPr lang="de-DE" dirty="0" err="1"/>
+              <a:t>Directories</a:t>
+            </a:r>
+            <a:endParaRPr lang="de-DE" dirty="0"/>
+          </a:p>
+          <a:p>
             <a:pPr marL="285750" indent="-285750">
               <a:buFont typeface="Arial" panose="020B0604020202020204" pitchFamily="34" charset="0"/>
               <a:buChar char="•"/>
             </a:pPr>
             <a:endParaRPr lang="de-DE" dirty="0"/>
           </a:p>
+          <a:p>
+            <a:r>
+              <a:rPr lang="de-DE" b="1" dirty="0"/>
+              <a:t>Generatoren</a:t>
+            </a:r>
+          </a:p>
+          <a:p>
+            <a:pPr marL="285750" indent="-285750">
+              <a:buFont typeface="Arial" panose="020B0604020202020204" pitchFamily="34" charset="0"/>
+              <a:buChar char="•"/>
+            </a:pPr>
+            <a:r>
+              <a:rPr lang="de-DE" dirty="0" err="1"/>
+              <a:t>kustomization.yaml</a:t>
+            </a:r>
+            <a:endParaRPr lang="de-DE" dirty="0"/>
+          </a:p>
         </p:txBody>
       </p:sp>
     </p:spTree>
     <p:extLst>
       <p:ext uri="{BB962C8B-B14F-4D97-AF65-F5344CB8AC3E}">
-        <p14:creationId xmlns:p14="http://schemas.microsoft.com/office/powerpoint/2010/main" val="4065652997"/>
+        <p14:creationId xmlns:p14="http://schemas.microsoft.com/office/powerpoint/2010/main" val="1015194288"/>
       </p:ext>
     </p:extLst>
   </p:cSld>
@@ -5205,9 +5690,12 @@
           <a:p>
             <a:r>
               <a:rPr lang="de-DE" dirty="0" err="1"/>
-              <a:t>Takeaways</a:t>
-            </a:r>
-            <a:endParaRPr lang="de-DE" dirty="0"/>
+              <a:t>Secrets</a:t>
+            </a:r>
+            <a:r>
+              <a:rPr lang="de-DE" dirty="0"/>
+              <a:t> erzeugen</a:t>
+            </a:r>
           </a:p>
         </p:txBody>
       </p:sp>
@@ -5234,63 +5722,64 @@
           </a:bodyPr>
           <a:lstStyle/>
           <a:p>
+            <a:r>
+              <a:rPr lang="de-DE" b="1" dirty="0"/>
+              <a:t>siehe </a:t>
+            </a:r>
+            <a:r>
+              <a:rPr lang="de-DE" b="1" dirty="0" err="1"/>
+              <a:t>ConfigMaps</a:t>
+            </a:r>
+            <a:endParaRPr lang="de-DE" b="1" dirty="0"/>
+          </a:p>
+          <a:p>
+            <a:r>
+              <a:rPr lang="de-DE" dirty="0">
+                <a:sym typeface="Wingdings" pitchFamily="2" charset="2"/>
+              </a:rPr>
+              <a:t> keine Manifeste</a:t>
+            </a:r>
+            <a:endParaRPr lang="de-DE" dirty="0"/>
+          </a:p>
+          <a:p>
+            <a:endParaRPr lang="de-DE" b="1" dirty="0"/>
+          </a:p>
+          <a:p>
+            <a:r>
+              <a:rPr lang="de-DE" b="1" dirty="0" err="1"/>
+              <a:t>kubectl</a:t>
+            </a:r>
+            <a:r>
+              <a:rPr lang="de-DE" b="1" dirty="0"/>
+              <a:t> </a:t>
+            </a:r>
+            <a:r>
+              <a:rPr lang="de-DE" b="1" dirty="0" err="1"/>
+              <a:t>create</a:t>
+            </a:r>
+            <a:r>
+              <a:rPr lang="de-DE" b="1" dirty="0"/>
+              <a:t> </a:t>
+            </a:r>
+            <a:r>
+              <a:rPr lang="de-DE" b="1" dirty="0" err="1"/>
+              <a:t>secret</a:t>
+            </a:r>
+            <a:r>
+              <a:rPr lang="de-DE" b="1" dirty="0"/>
+              <a:t> &lt;type&gt;</a:t>
+            </a:r>
+          </a:p>
+          <a:p>
             <a:pPr marL="285750" indent="-285750">
               <a:buFont typeface="Arial" panose="020B0604020202020204" pitchFamily="34" charset="0"/>
               <a:buChar char="•"/>
             </a:pPr>
             <a:r>
-              <a:rPr lang="de-DE" dirty="0"/>
-              <a:t>Schritte in den k8s-Cluster:</a:t>
-            </a:r>
-          </a:p>
-          <a:p>
-            <a:pPr marL="552450" lvl="1" indent="-285750">
-              <a:buFont typeface="Arial" panose="020B0604020202020204" pitchFamily="34" charset="0"/>
-              <a:buChar char="•"/>
-            </a:pPr>
-            <a:r>
-              <a:rPr lang="de-DE" dirty="0"/>
-              <a:t>Architektur der App muss geeignet sein (</a:t>
-            </a:r>
-            <a:r>
               <a:rPr lang="de-DE" dirty="0" err="1"/>
-              <a:t>Microservices</a:t>
-            </a:r>
-            <a:r>
-              <a:rPr lang="de-DE" dirty="0"/>
-              <a:t>)</a:t>
-            </a:r>
-          </a:p>
-          <a:p>
-            <a:pPr marL="552450" lvl="1" indent="-285750">
-              <a:buFont typeface="Arial" panose="020B0604020202020204" pitchFamily="34" charset="0"/>
-              <a:buChar char="•"/>
-            </a:pPr>
-            <a:r>
-              <a:rPr lang="de-DE" dirty="0" err="1"/>
-              <a:t>Containerisierung</a:t>
+              <a:t>generic</a:t>
             </a:r>
             <a:endParaRPr lang="de-DE" dirty="0"/>
-          </a:p>
-          <a:p>
-            <a:pPr marL="552450" lvl="1" indent="-285750">
-              <a:buFont typeface="Arial" panose="020B0604020202020204" pitchFamily="34" charset="0"/>
-              <a:buChar char="•"/>
-            </a:pPr>
-            <a:r>
-              <a:rPr lang="de-DE" dirty="0"/>
-              <a:t>Bereitstellung der Container</a:t>
-            </a:r>
-          </a:p>
-          <a:p>
-            <a:pPr marL="552450" lvl="1" indent="-285750">
-              <a:buFont typeface="Arial" panose="020B0604020202020204" pitchFamily="34" charset="0"/>
-              <a:buChar char="•"/>
-            </a:pPr>
-            <a:r>
-              <a:rPr lang="de-DE" dirty="0"/>
-              <a:t>Ressourcen definieren</a:t>
-            </a:r>
           </a:p>
           <a:p>
             <a:pPr marL="285750" indent="-285750">
@@ -5298,9 +5787,10 @@
               <a:buChar char="•"/>
             </a:pPr>
             <a:r>
-              <a:rPr lang="de-DE" dirty="0"/>
-              <a:t>Best Practices vereinfachen Entwicklung von Manifesten</a:t>
-            </a:r>
+              <a:rPr lang="de-DE" dirty="0" err="1"/>
+              <a:t>tls</a:t>
+            </a:r>
+            <a:endParaRPr lang="de-DE" dirty="0"/>
           </a:p>
           <a:p>
             <a:pPr marL="285750" indent="-285750">
@@ -5309,28 +5799,15 @@
             </a:pPr>
             <a:r>
               <a:rPr lang="de-DE" dirty="0" err="1"/>
-              <a:t>Grafana</a:t>
-            </a:r>
-            <a:r>
-              <a:rPr lang="de-DE" dirty="0"/>
-              <a:t> kann komfortabel konfiguriert werden (</a:t>
-            </a:r>
-            <a:r>
-              <a:rPr lang="de-DE" dirty="0" err="1"/>
-              <a:t>ConfigMap</a:t>
-            </a:r>
-            <a:r>
-              <a:rPr lang="de-DE" dirty="0"/>
-              <a:t>)</a:t>
-            </a:r>
-          </a:p>
-          <a:p>
+              <a:t>docker-registry</a:t>
+            </a:r>
             <a:endParaRPr lang="de-DE" dirty="0"/>
           </a:p>
           <a:p>
-            <a:endParaRPr lang="de-DE" dirty="0"/>
-          </a:p>
-          <a:p>
+            <a:pPr marL="285750" indent="-285750">
+              <a:buFont typeface="Arial" panose="020B0604020202020204" pitchFamily="34" charset="0"/>
+              <a:buChar char="•"/>
+            </a:pPr>
             <a:endParaRPr lang="de-DE" dirty="0"/>
           </a:p>
         </p:txBody>
@@ -5338,7 +5815,7 @@
     </p:spTree>
     <p:extLst>
       <p:ext uri="{BB962C8B-B14F-4D97-AF65-F5344CB8AC3E}">
-        <p14:creationId xmlns:p14="http://schemas.microsoft.com/office/powerpoint/2010/main" val="3615434718"/>
+        <p14:creationId xmlns:p14="http://schemas.microsoft.com/office/powerpoint/2010/main" val="2398007689"/>
       </p:ext>
     </p:extLst>
   </p:cSld>
@@ -5387,8 +5864,12 @@
           <a:lstStyle/>
           <a:p>
             <a:r>
+              <a:rPr lang="de-DE" dirty="0"/>
+              <a:t>Umgang mit </a:t>
+            </a:r>
+            <a:r>
               <a:rPr lang="de-DE" dirty="0" err="1"/>
-              <a:t>Misc</a:t>
+              <a:t>Secrets</a:t>
             </a:r>
             <a:endParaRPr lang="de-DE" dirty="0"/>
           </a:p>
@@ -5413,157 +5894,14 @@
         <p:spPr/>
         <p:txBody>
           <a:bodyPr>
-            <a:normAutofit fontScale="85000" lnSpcReduction="20000"/>
+            <a:normAutofit/>
           </a:bodyPr>
           <a:lstStyle/>
           <a:p>
-            <a:r>
-              <a:rPr lang="de-DE" b="1" dirty="0"/>
-              <a:t>Materialien zum Talk</a:t>
-            </a:r>
-          </a:p>
-          <a:p>
-            <a:r>
-              <a:rPr lang="de-DE" dirty="0">
-                <a:hlinkClick r:id="rId3"/>
-              </a:rPr>
-              <a:t>https://github.com/grothesk/deeptalk</a:t>
-            </a:r>
-            <a:endParaRPr lang="de-DE" dirty="0"/>
-          </a:p>
-          <a:p>
-            <a:endParaRPr lang="de-DE" dirty="0"/>
-          </a:p>
-          <a:p>
-            <a:r>
-              <a:rPr lang="de-DE" b="1" dirty="0"/>
-              <a:t>Weiterführendes</a:t>
-            </a:r>
-          </a:p>
-          <a:p>
-            <a:r>
-              <a:rPr lang="de-DE" dirty="0" err="1"/>
-              <a:t>Celery</a:t>
-            </a:r>
-            <a:r>
-              <a:rPr lang="de-DE" dirty="0"/>
-              <a:t> </a:t>
-            </a:r>
-            <a:r>
-              <a:rPr lang="de-DE" dirty="0">
-                <a:sym typeface="Wingdings" pitchFamily="2" charset="2"/>
-              </a:rPr>
-              <a:t> </a:t>
-            </a:r>
-            <a:r>
-              <a:rPr lang="de-DE" dirty="0"/>
-              <a:t>Asynchron in Python: </a:t>
-            </a:r>
-            <a:r>
-              <a:rPr lang="de-DE" dirty="0">
-                <a:hlinkClick r:id="rId4"/>
-              </a:rPr>
-              <a:t>https://docs.celeryproject.org</a:t>
-            </a:r>
-            <a:endParaRPr lang="de-DE" dirty="0"/>
-          </a:p>
-          <a:p>
-            <a:r>
-              <a:rPr lang="de-DE" dirty="0"/>
-              <a:t>Django </a:t>
-            </a:r>
-            <a:r>
-              <a:rPr lang="de-DE" dirty="0">
-                <a:sym typeface="Wingdings" pitchFamily="2" charset="2"/>
-              </a:rPr>
-              <a:t> Alternative zu </a:t>
-            </a:r>
-            <a:r>
-              <a:rPr lang="de-DE" dirty="0" err="1">
-                <a:sym typeface="Wingdings" pitchFamily="2" charset="2"/>
-              </a:rPr>
-              <a:t>Flask</a:t>
-            </a:r>
-            <a:r>
-              <a:rPr lang="de-DE" dirty="0">
-                <a:sym typeface="Wingdings" pitchFamily="2" charset="2"/>
-              </a:rPr>
-              <a:t>: </a:t>
-            </a:r>
-            <a:r>
-              <a:rPr lang="de-DE" dirty="0">
-                <a:hlinkClick r:id="rId5"/>
-              </a:rPr>
-              <a:t>https://www.djangoproject.com</a:t>
-            </a:r>
-            <a:endParaRPr lang="de-DE" dirty="0"/>
-          </a:p>
-          <a:p>
-            <a:r>
-              <a:rPr lang="de-DE" dirty="0" err="1"/>
-              <a:t>Skaffold</a:t>
-            </a:r>
-            <a:r>
-              <a:rPr lang="de-DE" dirty="0"/>
-              <a:t> </a:t>
-            </a:r>
-            <a:r>
-              <a:rPr lang="de-DE" dirty="0">
-                <a:sym typeface="Wingdings" pitchFamily="2" charset="2"/>
-              </a:rPr>
-              <a:t> Entwicklung von k8s-Anwendungen: </a:t>
-            </a:r>
-            <a:r>
-              <a:rPr lang="de-DE" dirty="0">
-                <a:hlinkClick r:id="rId6"/>
-              </a:rPr>
-              <a:t>https://skaffold.dev</a:t>
-            </a:r>
-            <a:endParaRPr lang="de-DE" dirty="0"/>
-          </a:p>
-          <a:p>
-            <a:endParaRPr lang="de-DE" dirty="0"/>
-          </a:p>
-          <a:p>
-            <a:r>
-              <a:rPr lang="de-DE" b="1" dirty="0"/>
-              <a:t>Feedback , Anregungen, Themenvorschläge</a:t>
-            </a:r>
-          </a:p>
-          <a:p>
-            <a:r>
-              <a:rPr lang="de-DE" dirty="0">
-                <a:hlinkClick r:id="rId7"/>
-              </a:rPr>
-              <a:t>florian.boldt@deepshore.de</a:t>
-            </a:r>
-            <a:endParaRPr lang="de-DE" dirty="0"/>
-          </a:p>
-          <a:p>
-            <a:r>
-              <a:rPr lang="de-DE" dirty="0">
-                <a:hlinkClick r:id="rId8"/>
-              </a:rPr>
-              <a:t>malte.groth@deepshore.de</a:t>
-            </a:r>
-            <a:endParaRPr lang="de-DE" dirty="0"/>
-          </a:p>
-          <a:p>
-            <a:r>
-              <a:rPr lang="de-DE" dirty="0">
-                <a:hlinkClick r:id="rId9"/>
-              </a:rPr>
-              <a:t>frederic.born@deepshore.de</a:t>
-            </a:r>
-            <a:endParaRPr lang="de-DE" dirty="0"/>
-          </a:p>
-          <a:p>
-            <a:endParaRPr lang="de-DE" dirty="0"/>
-          </a:p>
-          <a:p>
-            <a:endParaRPr lang="de-DE" dirty="0"/>
-          </a:p>
-          <a:p>
+            <a:pPr marL="285750" indent="-285750">
+              <a:buFont typeface="Arial" panose="020B0604020202020204" pitchFamily="34" charset="0"/>
+              <a:buChar char="•"/>
+            </a:pPr>
             <a:endParaRPr lang="de-DE" dirty="0"/>
           </a:p>
         </p:txBody>
@@ -5571,7 +5909,7 @@
     </p:spTree>
     <p:extLst>
       <p:ext uri="{BB962C8B-B14F-4D97-AF65-F5344CB8AC3E}">
-        <p14:creationId xmlns:p14="http://schemas.microsoft.com/office/powerpoint/2010/main" val="1579135088"/>
+        <p14:creationId xmlns:p14="http://schemas.microsoft.com/office/powerpoint/2010/main" val="4065652997"/>
       </p:ext>
     </p:extLst>
   </p:cSld>
@@ -5603,7 +5941,7 @@
           <p:cNvPr id="2" name="Titel 1">
             <a:extLst>
               <a:ext uri="{FF2B5EF4-FFF2-40B4-BE49-F238E27FC236}">
-                <a16:creationId xmlns:a16="http://schemas.microsoft.com/office/drawing/2014/main" id="{693F10F7-6A72-7443-9D29-766F88D4FE7E}"/>
+                <a16:creationId xmlns:a16="http://schemas.microsoft.com/office/drawing/2014/main" id="{63E74088-BB91-574B-9695-A0121785026E}"/>
               </a:ext>
             </a:extLst>
           </p:cNvPr>
@@ -5620,9 +5958,10 @@
           <a:lstStyle/>
           <a:p>
             <a:r>
-              <a:rPr lang="de-DE" dirty="0"/>
-              <a:t>Ausblick</a:t>
-            </a:r>
+              <a:rPr lang="de-DE" dirty="0" err="1"/>
+              <a:t>Takeaways</a:t>
+            </a:r>
+            <a:endParaRPr lang="de-DE" dirty="0"/>
           </a:p>
         </p:txBody>
       </p:sp>
@@ -5631,7 +5970,7 @@
           <p:cNvPr id="3" name="Inhaltsplatzhalter 2">
             <a:extLst>
               <a:ext uri="{FF2B5EF4-FFF2-40B4-BE49-F238E27FC236}">
-                <a16:creationId xmlns:a16="http://schemas.microsoft.com/office/drawing/2014/main" id="{86FD58D8-14F3-0B49-A927-BE31094219CF}"/>
+                <a16:creationId xmlns:a16="http://schemas.microsoft.com/office/drawing/2014/main" id="{0EEB0F87-B7B4-B946-A3AA-B4CFBE864340}"/>
               </a:ext>
             </a:extLst>
           </p:cNvPr>
@@ -5644,61 +5983,97 @@
         </p:nvSpPr>
         <p:spPr/>
         <p:txBody>
-          <a:bodyPr/>
+          <a:bodyPr>
+            <a:normAutofit/>
+          </a:bodyPr>
           <a:lstStyle/>
           <a:p>
-            <a:pPr marL="360">
-              <a:spcBef>
-                <a:spcPts val="799"/>
-              </a:spcBef>
+            <a:pPr marL="285750" indent="-285750">
+              <a:buFont typeface="Arial" panose="020B0604020202020204" pitchFamily="34" charset="0"/>
+              <a:buChar char="•"/>
             </a:pPr>
             <a:r>
-              <a:rPr lang="de-DE" spc="-1" dirty="0">
-                <a:solidFill>
-                  <a:srgbClr val="000000"/>
-                </a:solidFill>
-                <a:latin typeface="Verdana"/>
-              </a:rPr>
-              <a:t>Persistenz in </a:t>
-            </a:r>
-            <a:r>
-              <a:rPr lang="de-DE" spc="-1" dirty="0" err="1">
-                <a:solidFill>
-                  <a:srgbClr val="000000"/>
-                </a:solidFill>
-                <a:latin typeface="Verdana"/>
-              </a:rPr>
-              <a:t>Kubernetes</a:t>
-            </a:r>
-            <a:r>
-              <a:rPr lang="de-DE" spc="-1" dirty="0">
-                <a:solidFill>
-                  <a:srgbClr val="000000"/>
-                </a:solidFill>
-                <a:latin typeface="Verdana"/>
-              </a:rPr>
-              <a:t>:</a:t>
-            </a:r>
-          </a:p>
-          <a:p>
-            <a:pPr marL="360">
-              <a:spcBef>
-                <a:spcPts val="799"/>
-              </a:spcBef>
+              <a:rPr lang="de-DE" dirty="0" err="1"/>
+              <a:t>Konfi</a:t>
+            </a:r>
+            <a:endParaRPr lang="de-DE" dirty="0"/>
+          </a:p>
+          <a:p>
+            <a:pPr marL="552450" lvl="1" indent="-285750">
+              <a:buFont typeface="Arial" panose="020B0604020202020204" pitchFamily="34" charset="0"/>
+              <a:buChar char="•"/>
             </a:pPr>
-            <a:endParaRPr lang="de-DE" spc="-1" dirty="0">
-              <a:solidFill>
-                <a:srgbClr val="000000"/>
-              </a:solidFill>
-              <a:latin typeface="Verdana"/>
-            </a:endParaRPr>
+            <a:r>
+              <a:rPr lang="de-DE" dirty="0"/>
+              <a:t>Architektur der App muss geeignet sein (</a:t>
+            </a:r>
+            <a:r>
+              <a:rPr lang="de-DE" dirty="0" err="1"/>
+              <a:t>Microservices</a:t>
+            </a:r>
+            <a:r>
+              <a:rPr lang="de-DE" dirty="0"/>
+              <a:t>)</a:t>
+            </a:r>
+          </a:p>
+          <a:p>
+            <a:pPr marL="552450" lvl="1" indent="-285750">
+              <a:buFont typeface="Arial" panose="020B0604020202020204" pitchFamily="34" charset="0"/>
+              <a:buChar char="•"/>
+            </a:pPr>
+            <a:r>
+              <a:rPr lang="de-DE" dirty="0" err="1"/>
+              <a:t>Containerisierung</a:t>
+            </a:r>
+            <a:endParaRPr lang="de-DE" dirty="0"/>
+          </a:p>
+          <a:p>
+            <a:pPr marL="285750" indent="-285750">
+              <a:buFont typeface="Arial" panose="020B0604020202020204" pitchFamily="34" charset="0"/>
+              <a:buChar char="•"/>
+            </a:pPr>
+            <a:r>
+              <a:rPr lang="de-DE" dirty="0"/>
+              <a:t>Best Practices vereinfachen Entwicklung von Manifesten</a:t>
+            </a:r>
+          </a:p>
+          <a:p>
+            <a:pPr marL="285750" indent="-285750">
+              <a:buFont typeface="Arial" panose="020B0604020202020204" pitchFamily="34" charset="0"/>
+              <a:buChar char="•"/>
+            </a:pPr>
+            <a:r>
+              <a:rPr lang="de-DE" dirty="0" err="1"/>
+              <a:t>Grafana</a:t>
+            </a:r>
+            <a:r>
+              <a:rPr lang="de-DE" dirty="0"/>
+              <a:t> kann komfortabel konfiguriert werden (</a:t>
+            </a:r>
+            <a:r>
+              <a:rPr lang="de-DE" dirty="0" err="1"/>
+              <a:t>ConfigMap</a:t>
+            </a:r>
+            <a:r>
+              <a:rPr lang="de-DE" dirty="0"/>
+              <a:t>)</a:t>
+            </a:r>
+          </a:p>
+          <a:p>
+            <a:endParaRPr lang="de-DE" dirty="0"/>
+          </a:p>
+          <a:p>
+            <a:endParaRPr lang="de-DE" dirty="0"/>
+          </a:p>
+          <a:p>
+            <a:endParaRPr lang="de-DE" dirty="0"/>
           </a:p>
         </p:txBody>
       </p:sp>
     </p:spTree>
     <p:extLst>
       <p:ext uri="{BB962C8B-B14F-4D97-AF65-F5344CB8AC3E}">
-        <p14:creationId xmlns:p14="http://schemas.microsoft.com/office/powerpoint/2010/main" val="1036390888"/>
+        <p14:creationId xmlns:p14="http://schemas.microsoft.com/office/powerpoint/2010/main" val="3615434718"/>
       </p:ext>
     </p:extLst>
   </p:cSld>

</xml_diff>

<commit_message>
Updated presentation, created pdf
</commit_message>
<xml_diff>
--- a/04-configmaps-und-secrets/deeptalk-04.pptx
+++ b/04-configmaps-und-secrets/deeptalk-04.pptx
@@ -5,10 +5,10 @@
     <p:sldMasterId id="2147483648" r:id="rId1"/>
   </p:sldMasterIdLst>
   <p:notesMasterIdLst>
-    <p:notesMasterId r:id="rId23"/>
+    <p:notesMasterId r:id="rId24"/>
   </p:notesMasterIdLst>
   <p:handoutMasterIdLst>
-    <p:handoutMasterId r:id="rId24"/>
+    <p:handoutMasterId r:id="rId25"/>
   </p:handoutMasterIdLst>
   <p:sldIdLst>
     <p:sldId id="471" r:id="rId2"/>
@@ -29,33 +29,34 @@
     <p:sldId id="528" r:id="rId17"/>
     <p:sldId id="529" r:id="rId18"/>
     <p:sldId id="530" r:id="rId19"/>
-    <p:sldId id="499" r:id="rId20"/>
-    <p:sldId id="508" r:id="rId21"/>
-    <p:sldId id="495" r:id="rId22"/>
+    <p:sldId id="544" r:id="rId20"/>
+    <p:sldId id="499" r:id="rId21"/>
+    <p:sldId id="508" r:id="rId22"/>
+    <p:sldId id="495" r:id="rId23"/>
   </p:sldIdLst>
   <p:sldSz cx="9144000" cy="5715000" type="screen16x10"/>
   <p:notesSz cx="7099300" cy="10234613"/>
   <p:embeddedFontLst>
     <p:embeddedFont>
       <p:font typeface="Calibri" panose="020F0502020204030204" pitchFamily="34" charset="0"/>
-      <p:regular r:id="rId25"/>
-      <p:bold r:id="rId25"/>
-      <p:italic r:id="rId25"/>
-      <p:boldItalic r:id="rId25"/>
+      <p:regular r:id="rId26"/>
+      <p:bold r:id="rId26"/>
+      <p:italic r:id="rId26"/>
+      <p:boldItalic r:id="rId26"/>
     </p:embeddedFont>
     <p:embeddedFont>
       <p:font typeface="Helvetica" pitchFamily="2" charset="0"/>
-      <p:regular r:id="rId25"/>
-      <p:bold r:id="rId25"/>
-      <p:italic r:id="rId25"/>
-      <p:boldItalic r:id="rId25"/>
+      <p:regular r:id="rId26"/>
+      <p:bold r:id="rId26"/>
+      <p:italic r:id="rId26"/>
+      <p:boldItalic r:id="rId26"/>
     </p:embeddedFont>
     <p:embeddedFont>
       <p:font typeface="Verdana" panose="020B0604030504040204" pitchFamily="34" charset="0"/>
-      <p:regular r:id="rId25"/>
-      <p:bold r:id="rId25"/>
-      <p:italic r:id="rId25"/>
-      <p:boldItalic r:id="rId25"/>
+      <p:regular r:id="rId26"/>
+      <p:bold r:id="rId26"/>
+      <p:italic r:id="rId26"/>
+      <p:boldItalic r:id="rId26"/>
     </p:embeddedFont>
   </p:embeddedFontLst>
   <p:defaultTextStyle>
@@ -1074,12 +1075,6 @@
           <a:bodyPr/>
           <a:lstStyle/>
           <a:p>
-            <a:r>
-              <a:rPr lang="de-DE" dirty="0">
-                <a:hlinkClick r:id="rId3"/>
-              </a:rPr>
-              <a:t>https://www.docker.com/resources/what-container</a:t>
-            </a:r>
             <a:endParaRPr lang="de-DE" dirty="0"/>
           </a:p>
         </p:txBody>
@@ -1170,12 +1165,6 @@
           <a:bodyPr/>
           <a:lstStyle/>
           <a:p>
-            <a:r>
-              <a:rPr lang="de-DE" dirty="0">
-                <a:hlinkClick r:id="rId3"/>
-              </a:rPr>
-              <a:t>https://www.docker.com/resources/what-container</a:t>
-            </a:r>
             <a:endParaRPr lang="de-DE" dirty="0"/>
           </a:p>
         </p:txBody>
@@ -1266,12 +1255,6 @@
           <a:bodyPr/>
           <a:lstStyle/>
           <a:p>
-            <a:r>
-              <a:rPr lang="de-DE" dirty="0">
-                <a:hlinkClick r:id="rId3"/>
-              </a:rPr>
-              <a:t>https://www.docker.com/resources/what-container</a:t>
-            </a:r>
             <a:endParaRPr lang="de-DE" dirty="0"/>
           </a:p>
         </p:txBody>
@@ -1362,12 +1345,6 @@
           <a:bodyPr/>
           <a:lstStyle/>
           <a:p>
-            <a:r>
-              <a:rPr lang="de-DE" dirty="0">
-                <a:hlinkClick r:id="rId3"/>
-              </a:rPr>
-              <a:t>https://www.docker.com/resources/what-container</a:t>
-            </a:r>
             <a:endParaRPr lang="de-DE" dirty="0"/>
           </a:p>
         </p:txBody>
@@ -1458,12 +1435,6 @@
           <a:bodyPr/>
           <a:lstStyle/>
           <a:p>
-            <a:r>
-              <a:rPr lang="de-DE" dirty="0">
-                <a:hlinkClick r:id="rId3"/>
-              </a:rPr>
-              <a:t>https://www.docker.com/resources/what-container</a:t>
-            </a:r>
             <a:endParaRPr lang="de-DE" dirty="0"/>
           </a:p>
         </p:txBody>
@@ -1554,12 +1525,6 @@
           <a:bodyPr/>
           <a:lstStyle/>
           <a:p>
-            <a:r>
-              <a:rPr lang="de-DE" dirty="0">
-                <a:hlinkClick r:id="rId3"/>
-              </a:rPr>
-              <a:t>https://www.docker.com/resources/what-container</a:t>
-            </a:r>
             <a:endParaRPr lang="de-DE" dirty="0"/>
           </a:p>
         </p:txBody>
@@ -1596,7 +1561,277 @@
     </p:spTree>
     <p:extLst>
       <p:ext uri="{BB962C8B-B14F-4D97-AF65-F5344CB8AC3E}">
+        <p14:creationId xmlns:p14="http://schemas.microsoft.com/office/powerpoint/2010/main" val="3913887964"/>
+      </p:ext>
+    </p:extLst>
+  </p:cSld>
+  <p:clrMapOvr>
+    <a:masterClrMapping/>
+  </p:clrMapOvr>
+</p:notes>
+</file>
+
+<file path=ppt/notesSlides/notesSlide16.xml><?xml version="1.0" encoding="utf-8"?>
+<p:notes xmlns:a="http://schemas.openxmlformats.org/drawingml/2006/main" xmlns:r="http://schemas.openxmlformats.org/officeDocument/2006/relationships" xmlns:p="http://schemas.openxmlformats.org/presentationml/2006/main">
+  <p:cSld>
+    <p:spTree>
+      <p:nvGrpSpPr>
+        <p:cNvPr id="1" name=""/>
+        <p:cNvGrpSpPr/>
+        <p:nvPr/>
+      </p:nvGrpSpPr>
+      <p:grpSpPr>
+        <a:xfrm>
+          <a:off x="0" y="0"/>
+          <a:ext cx="0" cy="0"/>
+          <a:chOff x="0" y="0"/>
+          <a:chExt cx="0" cy="0"/>
+        </a:xfrm>
+      </p:grpSpPr>
+      <p:sp>
+        <p:nvSpPr>
+          <p:cNvPr id="2" name="Folienbildplatzhalter 1"/>
+          <p:cNvSpPr>
+            <a:spLocks noGrp="1" noRot="1" noChangeAspect="1"/>
+          </p:cNvSpPr>
+          <p:nvPr>
+            <p:ph type="sldImg"/>
+          </p:nvPr>
+        </p:nvSpPr>
+        <p:spPr/>
+      </p:sp>
+      <p:sp>
+        <p:nvSpPr>
+          <p:cNvPr id="3" name="Notizenplatzhalter 2"/>
+          <p:cNvSpPr>
+            <a:spLocks noGrp="1"/>
+          </p:cNvSpPr>
+          <p:nvPr>
+            <p:ph type="body" idx="1"/>
+          </p:nvPr>
+        </p:nvSpPr>
+        <p:spPr/>
+        <p:txBody>
+          <a:bodyPr/>
+          <a:lstStyle/>
+          <a:p>
+            <a:endParaRPr lang="de-DE" dirty="0"/>
+          </a:p>
+        </p:txBody>
+      </p:sp>
+      <p:sp>
+        <p:nvSpPr>
+          <p:cNvPr id="4" name="Foliennummernplatzhalter 3"/>
+          <p:cNvSpPr>
+            <a:spLocks noGrp="1"/>
+          </p:cNvSpPr>
+          <p:nvPr>
+            <p:ph type="sldNum" sz="quarter" idx="5"/>
+          </p:nvPr>
+        </p:nvSpPr>
+        <p:spPr/>
+        <p:txBody>
+          <a:bodyPr/>
+          <a:lstStyle/>
+          <a:p>
+            <a:pPr>
+              <a:defRPr/>
+            </a:pPr>
+            <a:fld id="{4D8C3D32-0CEC-4E75-98FF-2FBD233904A7}" type="slidenum">
+              <a:rPr lang="de-DE" smtClean="0"/>
+              <a:pPr>
+                <a:defRPr/>
+              </a:pPr>
+              <a:t>20</a:t>
+            </a:fld>
+            <a:endParaRPr lang="de-DE"/>
+          </a:p>
+        </p:txBody>
+      </p:sp>
+    </p:spTree>
+    <p:extLst>
+      <p:ext uri="{BB962C8B-B14F-4D97-AF65-F5344CB8AC3E}">
         <p14:creationId xmlns:p14="http://schemas.microsoft.com/office/powerpoint/2010/main" val="646348872"/>
+      </p:ext>
+    </p:extLst>
+  </p:cSld>
+  <p:clrMapOvr>
+    <a:masterClrMapping/>
+  </p:clrMapOvr>
+</p:notes>
+</file>
+
+<file path=ppt/notesSlides/notesSlide17.xml><?xml version="1.0" encoding="utf-8"?>
+<p:notes xmlns:a="http://schemas.openxmlformats.org/drawingml/2006/main" xmlns:r="http://schemas.openxmlformats.org/officeDocument/2006/relationships" xmlns:p="http://schemas.openxmlformats.org/presentationml/2006/main">
+  <p:cSld>
+    <p:spTree>
+      <p:nvGrpSpPr>
+        <p:cNvPr id="1" name=""/>
+        <p:cNvGrpSpPr/>
+        <p:nvPr/>
+      </p:nvGrpSpPr>
+      <p:grpSpPr>
+        <a:xfrm>
+          <a:off x="0" y="0"/>
+          <a:ext cx="0" cy="0"/>
+          <a:chOff x="0" y="0"/>
+          <a:chExt cx="0" cy="0"/>
+        </a:xfrm>
+      </p:grpSpPr>
+      <p:sp>
+        <p:nvSpPr>
+          <p:cNvPr id="2" name="Folienbildplatzhalter 1"/>
+          <p:cNvSpPr>
+            <a:spLocks noGrp="1" noRot="1" noChangeAspect="1"/>
+          </p:cNvSpPr>
+          <p:nvPr>
+            <p:ph type="sldImg"/>
+          </p:nvPr>
+        </p:nvSpPr>
+        <p:spPr/>
+      </p:sp>
+      <p:sp>
+        <p:nvSpPr>
+          <p:cNvPr id="3" name="Notizenplatzhalter 2"/>
+          <p:cNvSpPr>
+            <a:spLocks noGrp="1"/>
+          </p:cNvSpPr>
+          <p:nvPr>
+            <p:ph type="body" idx="1"/>
+          </p:nvPr>
+        </p:nvSpPr>
+        <p:spPr/>
+        <p:txBody>
+          <a:bodyPr/>
+          <a:lstStyle/>
+          <a:p>
+            <a:endParaRPr lang="de-DE" dirty="0"/>
+          </a:p>
+        </p:txBody>
+      </p:sp>
+      <p:sp>
+        <p:nvSpPr>
+          <p:cNvPr id="4" name="Foliennummernplatzhalter 3"/>
+          <p:cNvSpPr>
+            <a:spLocks noGrp="1"/>
+          </p:cNvSpPr>
+          <p:nvPr>
+            <p:ph type="sldNum" sz="quarter" idx="5"/>
+          </p:nvPr>
+        </p:nvSpPr>
+        <p:spPr/>
+        <p:txBody>
+          <a:bodyPr/>
+          <a:lstStyle/>
+          <a:p>
+            <a:pPr>
+              <a:defRPr/>
+            </a:pPr>
+            <a:fld id="{4D8C3D32-0CEC-4E75-98FF-2FBD233904A7}" type="slidenum">
+              <a:rPr lang="de-DE" smtClean="0"/>
+              <a:pPr>
+                <a:defRPr/>
+              </a:pPr>
+              <a:t>21</a:t>
+            </a:fld>
+            <a:endParaRPr lang="de-DE"/>
+          </a:p>
+        </p:txBody>
+      </p:sp>
+    </p:spTree>
+    <p:extLst>
+      <p:ext uri="{BB962C8B-B14F-4D97-AF65-F5344CB8AC3E}">
+        <p14:creationId xmlns:p14="http://schemas.microsoft.com/office/powerpoint/2010/main" val="2209578296"/>
+      </p:ext>
+    </p:extLst>
+  </p:cSld>
+  <p:clrMapOvr>
+    <a:masterClrMapping/>
+  </p:clrMapOvr>
+</p:notes>
+</file>
+
+<file path=ppt/notesSlides/notesSlide18.xml><?xml version="1.0" encoding="utf-8"?>
+<p:notes xmlns:a="http://schemas.openxmlformats.org/drawingml/2006/main" xmlns:r="http://schemas.openxmlformats.org/officeDocument/2006/relationships" xmlns:p="http://schemas.openxmlformats.org/presentationml/2006/main">
+  <p:cSld>
+    <p:spTree>
+      <p:nvGrpSpPr>
+        <p:cNvPr id="1" name=""/>
+        <p:cNvGrpSpPr/>
+        <p:nvPr/>
+      </p:nvGrpSpPr>
+      <p:grpSpPr>
+        <a:xfrm>
+          <a:off x="0" y="0"/>
+          <a:ext cx="0" cy="0"/>
+          <a:chOff x="0" y="0"/>
+          <a:chExt cx="0" cy="0"/>
+        </a:xfrm>
+      </p:grpSpPr>
+      <p:sp>
+        <p:nvSpPr>
+          <p:cNvPr id="2" name="Folienbildplatzhalter 1"/>
+          <p:cNvSpPr>
+            <a:spLocks noGrp="1" noRot="1" noChangeAspect="1"/>
+          </p:cNvSpPr>
+          <p:nvPr>
+            <p:ph type="sldImg"/>
+          </p:nvPr>
+        </p:nvSpPr>
+        <p:spPr/>
+      </p:sp>
+      <p:sp>
+        <p:nvSpPr>
+          <p:cNvPr id="3" name="Notizenplatzhalter 2"/>
+          <p:cNvSpPr>
+            <a:spLocks noGrp="1"/>
+          </p:cNvSpPr>
+          <p:nvPr>
+            <p:ph type="body" idx="1"/>
+          </p:nvPr>
+        </p:nvSpPr>
+        <p:spPr/>
+        <p:txBody>
+          <a:bodyPr/>
+          <a:lstStyle/>
+          <a:p>
+            <a:endParaRPr lang="de-DE"/>
+          </a:p>
+        </p:txBody>
+      </p:sp>
+      <p:sp>
+        <p:nvSpPr>
+          <p:cNvPr id="4" name="Foliennummernplatzhalter 3"/>
+          <p:cNvSpPr>
+            <a:spLocks noGrp="1"/>
+          </p:cNvSpPr>
+          <p:nvPr>
+            <p:ph type="sldNum" sz="quarter" idx="5"/>
+          </p:nvPr>
+        </p:nvSpPr>
+        <p:spPr/>
+        <p:txBody>
+          <a:bodyPr/>
+          <a:lstStyle/>
+          <a:p>
+            <a:pPr>
+              <a:defRPr/>
+            </a:pPr>
+            <a:fld id="{4D8C3D32-0CEC-4E75-98FF-2FBD233904A7}" type="slidenum">
+              <a:rPr lang="de-DE" smtClean="0"/>
+              <a:pPr>
+                <a:defRPr/>
+              </a:pPr>
+              <a:t>22</a:t>
+            </a:fld>
+            <a:endParaRPr lang="de-DE"/>
+          </a:p>
+        </p:txBody>
+      </p:sp>
+    </p:spTree>
+    <p:extLst>
+      <p:ext uri="{BB962C8B-B14F-4D97-AF65-F5344CB8AC3E}">
+        <p14:creationId xmlns:p14="http://schemas.microsoft.com/office/powerpoint/2010/main" val="3428613333"/>
       </p:ext>
     </p:extLst>
   </p:cSld>
@@ -1650,12 +1885,6 @@
           <a:bodyPr/>
           <a:lstStyle/>
           <a:p>
-            <a:r>
-              <a:rPr lang="de-DE" dirty="0">
-                <a:hlinkClick r:id="rId3"/>
-              </a:rPr>
-              <a:t>https://www.docker.com/resources/what-container</a:t>
-            </a:r>
             <a:endParaRPr lang="de-DE" dirty="0"/>
           </a:p>
         </p:txBody>
@@ -2016,12 +2245,6 @@
           <a:bodyPr/>
           <a:lstStyle/>
           <a:p>
-            <a:r>
-              <a:rPr lang="de-DE" dirty="0">
-                <a:hlinkClick r:id="rId3"/>
-              </a:rPr>
-              <a:t>https://www.docker.com/resources/what-container</a:t>
-            </a:r>
             <a:endParaRPr lang="de-DE" dirty="0"/>
           </a:p>
         </p:txBody>
@@ -2112,12 +2335,6 @@
           <a:bodyPr/>
           <a:lstStyle/>
           <a:p>
-            <a:r>
-              <a:rPr lang="de-DE" dirty="0">
-                <a:hlinkClick r:id="rId3"/>
-              </a:rPr>
-              <a:t>https://www.docker.com/resources/what-container</a:t>
-            </a:r>
             <a:endParaRPr lang="de-DE" dirty="0"/>
           </a:p>
         </p:txBody>
@@ -2208,12 +2425,6 @@
           <a:bodyPr/>
           <a:lstStyle/>
           <a:p>
-            <a:r>
-              <a:rPr lang="de-DE" dirty="0">
-                <a:hlinkClick r:id="rId3"/>
-              </a:rPr>
-              <a:t>https://www.docker.com/resources/what-container</a:t>
-            </a:r>
             <a:endParaRPr lang="de-DE" dirty="0"/>
           </a:p>
         </p:txBody>
@@ -2304,12 +2515,6 @@
           <a:bodyPr/>
           <a:lstStyle/>
           <a:p>
-            <a:r>
-              <a:rPr lang="de-DE" dirty="0">
-                <a:hlinkClick r:id="rId3"/>
-              </a:rPr>
-              <a:t>https://www.docker.com/resources/what-container</a:t>
-            </a:r>
             <a:endParaRPr lang="de-DE" dirty="0"/>
           </a:p>
         </p:txBody>
@@ -7349,7 +7554,15 @@
             </a:r>
             <a:r>
               <a:rPr lang="de-DE" dirty="0"/>
-              <a:t> System</a:t>
+              <a:t> System (</a:t>
+            </a:r>
+            <a:r>
+              <a:rPr lang="de-DE" dirty="0" err="1"/>
+              <a:t>Grafana</a:t>
+            </a:r>
+            <a:r>
+              <a:rPr lang="de-DE" dirty="0"/>
+              <a:t>)</a:t>
             </a:r>
           </a:p>
         </p:txBody>
@@ -7890,7 +8103,7 @@
             </a:r>
             <a:r>
               <a:rPr lang="de-DE" dirty="0"/>
-              <a:t> als Volume im </a:t>
+              <a:t> als Volume in einem </a:t>
             </a:r>
             <a:r>
               <a:rPr lang="de-DE" dirty="0" err="1"/>
@@ -9319,11 +9532,11 @@
           <a:lstStyle/>
           <a:p>
             <a:r>
-              <a:rPr lang="de-DE" dirty="0" err="1"/>
+              <a:rPr lang="de-DE" b="1" dirty="0" err="1"/>
               <a:t>Secrets</a:t>
             </a:r>
             <a:r>
-              <a:rPr lang="de-DE" dirty="0"/>
+              <a:rPr lang="de-DE" b="1" dirty="0"/>
               <a:t> enthalten sensible Daten</a:t>
             </a:r>
           </a:p>
@@ -9380,20 +9593,6 @@
             <a:endParaRPr lang="de-DE" dirty="0"/>
           </a:p>
           <a:p>
-            <a:pPr marL="285750" indent="-285750">
-              <a:buFont typeface="Arial" panose="020B0604020202020204" pitchFamily="34" charset="0"/>
-              <a:buChar char="•"/>
-            </a:pPr>
-            <a:r>
-              <a:rPr lang="de-DE" dirty="0"/>
-              <a:t>…</a:t>
-            </a:r>
-          </a:p>
-          <a:p>
-            <a:pPr marL="285750" indent="-285750">
-              <a:buFont typeface="Arial" panose="020B0604020202020204" pitchFamily="34" charset="0"/>
-              <a:buChar char="•"/>
-            </a:pPr>
             <a:endParaRPr lang="de-DE" dirty="0"/>
           </a:p>
           <a:p>
@@ -9458,7 +9657,7 @@
           <a:p>
             <a:r>
               <a:rPr lang="de-DE" dirty="0" err="1"/>
-              <a:t>Misc</a:t>
+              <a:t>Takeaways</a:t>
             </a:r>
             <a:endParaRPr lang="de-DE" dirty="0"/>
           </a:p>
@@ -9483,130 +9682,150 @@
         <p:spPr/>
         <p:txBody>
           <a:bodyPr>
-            <a:normAutofit fontScale="77500" lnSpcReduction="20000"/>
+            <a:normAutofit/>
           </a:bodyPr>
           <a:lstStyle/>
           <a:p>
-            <a:r>
-              <a:rPr lang="de-DE" b="1" dirty="0"/>
-              <a:t>Materialien zum Talk - NEU</a:t>
-            </a:r>
-          </a:p>
-          <a:p>
-            <a:r>
-              <a:rPr lang="de-DE" dirty="0">
-                <a:hlinkClick r:id="rId3"/>
-              </a:rPr>
-              <a:t>https://github.com/deepshore/deeptalk</a:t>
-            </a:r>
+            <a:pPr marL="285750" indent="-285750">
+              <a:buFont typeface="Arial" panose="020B0604020202020204" pitchFamily="34" charset="0"/>
+              <a:buChar char="•"/>
+            </a:pPr>
+            <a:r>
+              <a:rPr lang="de-DE" dirty="0" err="1"/>
+              <a:t>ConfigMaps</a:t>
+            </a:r>
+            <a:r>
+              <a:rPr lang="de-DE" dirty="0"/>
+              <a:t> und </a:t>
+            </a:r>
+            <a:r>
+              <a:rPr lang="de-DE" dirty="0" err="1"/>
+              <a:t>Secrets</a:t>
+            </a:r>
+            <a:r>
+              <a:rPr lang="de-DE" dirty="0"/>
+              <a:t> enthalten Konfigurationsdaten</a:t>
+            </a:r>
+          </a:p>
+          <a:p>
+            <a:pPr marL="285750" indent="-285750">
+              <a:buFont typeface="Arial" panose="020B0604020202020204" pitchFamily="34" charset="0"/>
+              <a:buChar char="•"/>
+            </a:pPr>
+            <a:r>
+              <a:rPr lang="de-DE" dirty="0" err="1"/>
+              <a:t>Secrets</a:t>
+            </a:r>
+            <a:r>
+              <a:rPr lang="de-DE" dirty="0"/>
+              <a:t> enthalten sensible Daten</a:t>
+            </a:r>
+          </a:p>
+          <a:p>
+            <a:pPr marL="285750" indent="-285750">
+              <a:buFont typeface="Arial" panose="020B0604020202020204" pitchFamily="34" charset="0"/>
+              <a:buChar char="•"/>
+            </a:pPr>
+            <a:r>
+              <a:rPr lang="de-DE" dirty="0"/>
+              <a:t>Key-Value-Paare können in </a:t>
+            </a:r>
+            <a:r>
+              <a:rPr lang="de-DE" dirty="0" err="1"/>
+              <a:t>Pods</a:t>
+            </a:r>
+            <a:r>
+              <a:rPr lang="de-DE" dirty="0"/>
+              <a:t> eingebracht werden als:</a:t>
+            </a:r>
+          </a:p>
+          <a:p>
+            <a:pPr marL="552450" lvl="1" indent="-285750">
+              <a:buFont typeface="Arial" panose="020B0604020202020204" pitchFamily="34" charset="0"/>
+              <a:buChar char="•"/>
+            </a:pPr>
+            <a:r>
+              <a:rPr lang="de-DE" dirty="0"/>
+              <a:t>Umgebungsvariablen</a:t>
+            </a:r>
+          </a:p>
+          <a:p>
+            <a:pPr marL="552450" lvl="1" indent="-285750">
+              <a:buFont typeface="Arial" panose="020B0604020202020204" pitchFamily="34" charset="0"/>
+              <a:buChar char="•"/>
+            </a:pPr>
+            <a:r>
+              <a:rPr lang="de-DE" dirty="0"/>
+              <a:t>Dateien</a:t>
+            </a:r>
+          </a:p>
+          <a:p>
+            <a:pPr marL="285750" indent="-285750">
+              <a:buFont typeface="Arial" panose="020B0604020202020204" pitchFamily="34" charset="0"/>
+              <a:buChar char="•"/>
+            </a:pPr>
+            <a:r>
+              <a:rPr lang="de-DE" dirty="0" err="1"/>
+              <a:t>ConfigMaps</a:t>
+            </a:r>
+            <a:r>
+              <a:rPr lang="de-DE" dirty="0"/>
+              <a:t> und </a:t>
+            </a:r>
+            <a:r>
+              <a:rPr lang="de-DE" dirty="0" err="1"/>
+              <a:t>Secrets</a:t>
+            </a:r>
+            <a:r>
+              <a:rPr lang="de-DE" dirty="0"/>
+              <a:t> können als </a:t>
+            </a:r>
+            <a:r>
+              <a:rPr lang="de-DE" dirty="0" err="1"/>
+              <a:t>Volumes</a:t>
+            </a:r>
+            <a:r>
+              <a:rPr lang="de-DE" dirty="0"/>
+              <a:t> verwendet werden</a:t>
+            </a:r>
+          </a:p>
+          <a:p>
+            <a:pPr marL="285750" indent="-285750">
+              <a:buFont typeface="Arial" panose="020B0604020202020204" pitchFamily="34" charset="0"/>
+              <a:buChar char="•"/>
+            </a:pPr>
+            <a:r>
+              <a:rPr lang="de-DE" dirty="0"/>
+              <a:t>Umgang mit </a:t>
+            </a:r>
+            <a:r>
+              <a:rPr lang="de-DE" dirty="0" err="1"/>
+              <a:t>Secrets</a:t>
+            </a:r>
+            <a:r>
+              <a:rPr lang="de-DE" dirty="0"/>
+              <a:t> erfordert Sorgfalt</a:t>
+            </a:r>
+          </a:p>
+          <a:p>
+            <a:pPr marL="285750" indent="-285750">
+              <a:buFont typeface="Arial" panose="020B0604020202020204" pitchFamily="34" charset="0"/>
+              <a:buChar char="•"/>
+            </a:pPr>
             <a:endParaRPr lang="de-DE" dirty="0"/>
           </a:p>
           <a:p>
+            <a:pPr marL="285750" indent="-285750">
+              <a:buFont typeface="Arial" panose="020B0604020202020204" pitchFamily="34" charset="0"/>
+              <a:buChar char="•"/>
+            </a:pPr>
             <a:endParaRPr lang="de-DE" dirty="0"/>
           </a:p>
           <a:p>
-            <a:r>
-              <a:rPr lang="de-DE" b="1" dirty="0"/>
-              <a:t>Weiterführendes</a:t>
-            </a:r>
-          </a:p>
-          <a:p>
-            <a:r>
-              <a:rPr lang="de-DE" dirty="0" err="1"/>
-              <a:t>Postgres</a:t>
-            </a:r>
-            <a:r>
-              <a:rPr lang="de-DE" dirty="0"/>
-              <a:t>: </a:t>
-            </a:r>
-            <a:r>
-              <a:rPr lang="de-DE" dirty="0">
-                <a:hlinkClick r:id="rId4"/>
-              </a:rPr>
-              <a:t>https://www.postgresql.org/</a:t>
-            </a:r>
-            <a:endParaRPr lang="de-DE" dirty="0"/>
-          </a:p>
-          <a:p>
-            <a:r>
-              <a:rPr lang="de-DE" dirty="0" err="1"/>
-              <a:t>Grafana</a:t>
-            </a:r>
-            <a:r>
-              <a:rPr lang="de-DE" dirty="0"/>
-              <a:t>: </a:t>
-            </a:r>
-            <a:r>
-              <a:rPr lang="de-DE" dirty="0">
-                <a:sym typeface="Wingdings" pitchFamily="2" charset="2"/>
-                <a:hlinkClick r:id="rId5"/>
-              </a:rPr>
-              <a:t>https://grafana.com/docs/grafana/latest/administration/provisioning/</a:t>
-            </a:r>
-            <a:endParaRPr lang="de-DE" dirty="0">
-              <a:sym typeface="Wingdings" pitchFamily="2" charset="2"/>
-            </a:endParaRPr>
-          </a:p>
-          <a:p>
-            <a:r>
-              <a:rPr lang="de-DE" dirty="0" err="1"/>
-              <a:t>Kubernetes</a:t>
-            </a:r>
-            <a:r>
-              <a:rPr lang="de-DE" dirty="0"/>
-              <a:t>: </a:t>
-            </a:r>
-            <a:r>
-              <a:rPr lang="de-DE" dirty="0">
-                <a:hlinkClick r:id="rId6"/>
-              </a:rPr>
-              <a:t>https://kubernetes.io/docs/home/</a:t>
-            </a:r>
-            <a:endParaRPr lang="de-DE" dirty="0"/>
-          </a:p>
-          <a:p>
-            <a:endParaRPr lang="de-DE" dirty="0"/>
-          </a:p>
-          <a:p>
-            <a:r>
-              <a:rPr lang="de-DE" b="1" dirty="0"/>
-              <a:t>Feedback , Anregungen, Themenvorschläge</a:t>
-            </a:r>
-          </a:p>
-          <a:p>
-            <a:r>
-              <a:rPr lang="de-DE" dirty="0">
-                <a:hlinkClick r:id="rId7"/>
-              </a:rPr>
-              <a:t>florian.boldt@deepshore.de</a:t>
-            </a:r>
-            <a:endParaRPr lang="de-DE" dirty="0"/>
-          </a:p>
-          <a:p>
-            <a:r>
-              <a:rPr lang="de-DE" dirty="0">
-                <a:hlinkClick r:id="rId8"/>
-              </a:rPr>
-              <a:t>malte.groth@deepshore.de</a:t>
-            </a:r>
-            <a:endParaRPr lang="de-DE" dirty="0"/>
-          </a:p>
-          <a:p>
-            <a:r>
-              <a:rPr lang="de-DE" dirty="0">
-                <a:hlinkClick r:id="rId9"/>
-              </a:rPr>
-              <a:t>frederic.born@deepshore.de</a:t>
-            </a:r>
-            <a:endParaRPr lang="de-DE" dirty="0"/>
-          </a:p>
-          <a:p>
-            <a:endParaRPr lang="de-DE" dirty="0"/>
-          </a:p>
-          <a:p>
-            <a:endParaRPr lang="de-DE" dirty="0"/>
-          </a:p>
-          <a:p>
+            <a:pPr marL="285750" indent="-285750">
+              <a:buFont typeface="Arial" panose="020B0604020202020204" pitchFamily="34" charset="0"/>
+              <a:buChar char="•"/>
+            </a:pPr>
             <a:endParaRPr lang="de-DE" dirty="0"/>
           </a:p>
         </p:txBody>
@@ -9614,7 +9833,7 @@
     </p:spTree>
     <p:extLst>
       <p:ext uri="{BB962C8B-B14F-4D97-AF65-F5344CB8AC3E}">
-        <p14:creationId xmlns:p14="http://schemas.microsoft.com/office/powerpoint/2010/main" val="1579135088"/>
+        <p14:creationId xmlns:p14="http://schemas.microsoft.com/office/powerpoint/2010/main" val="1142975960"/>
       </p:ext>
     </p:extLst>
   </p:cSld>
@@ -9691,17 +9910,18 @@
           <a:lstStyle/>
           <a:p>
             <a:r>
+              <a:rPr lang="de-DE" dirty="0" err="1"/>
+              <a:t>Recap</a:t>
+            </a:r>
+            <a:endParaRPr lang="de-DE" dirty="0"/>
+          </a:p>
+          <a:p>
+            <a:endParaRPr lang="de-DE" dirty="0"/>
+          </a:p>
+          <a:p>
+            <a:r>
               <a:rPr lang="de-DE" dirty="0"/>
-              <a:t>Grundlagen</a:t>
-            </a:r>
-          </a:p>
-          <a:p>
-            <a:endParaRPr lang="de-DE" dirty="0"/>
-          </a:p>
-          <a:p>
-            <a:r>
-              <a:rPr lang="de-DE" dirty="0"/>
-              <a:t>Beispiele aus der Praxis</a:t>
+              <a:t>Grundlagen und Beispiele aus der Praxis</a:t>
             </a:r>
           </a:p>
           <a:p>
@@ -9759,6 +9979,212 @@
           <p:cNvPr id="2" name="Titel 1">
             <a:extLst>
               <a:ext uri="{FF2B5EF4-FFF2-40B4-BE49-F238E27FC236}">
+                <a16:creationId xmlns:a16="http://schemas.microsoft.com/office/drawing/2014/main" id="{63E74088-BB91-574B-9695-A0121785026E}"/>
+              </a:ext>
+            </a:extLst>
+          </p:cNvPr>
+          <p:cNvSpPr>
+            <a:spLocks noGrp="1"/>
+          </p:cNvSpPr>
+          <p:nvPr>
+            <p:ph type="title"/>
+          </p:nvPr>
+        </p:nvSpPr>
+        <p:spPr/>
+        <p:txBody>
+          <a:bodyPr/>
+          <a:lstStyle/>
+          <a:p>
+            <a:r>
+              <a:rPr lang="de-DE" dirty="0" err="1"/>
+              <a:t>Misc</a:t>
+            </a:r>
+            <a:endParaRPr lang="de-DE" dirty="0"/>
+          </a:p>
+        </p:txBody>
+      </p:sp>
+      <p:sp>
+        <p:nvSpPr>
+          <p:cNvPr id="3" name="Inhaltsplatzhalter 2">
+            <a:extLst>
+              <a:ext uri="{FF2B5EF4-FFF2-40B4-BE49-F238E27FC236}">
+                <a16:creationId xmlns:a16="http://schemas.microsoft.com/office/drawing/2014/main" id="{0EEB0F87-B7B4-B946-A3AA-B4CFBE864340}"/>
+              </a:ext>
+            </a:extLst>
+          </p:cNvPr>
+          <p:cNvSpPr>
+            <a:spLocks noGrp="1"/>
+          </p:cNvSpPr>
+          <p:nvPr>
+            <p:ph idx="1"/>
+          </p:nvPr>
+        </p:nvSpPr>
+        <p:spPr/>
+        <p:txBody>
+          <a:bodyPr>
+            <a:normAutofit fontScale="77500" lnSpcReduction="20000"/>
+          </a:bodyPr>
+          <a:lstStyle/>
+          <a:p>
+            <a:r>
+              <a:rPr lang="de-DE" b="1" dirty="0"/>
+              <a:t>Materialien zum Talk - NEU</a:t>
+            </a:r>
+          </a:p>
+          <a:p>
+            <a:r>
+              <a:rPr lang="de-DE" dirty="0">
+                <a:hlinkClick r:id="rId3"/>
+              </a:rPr>
+              <a:t>https://github.com/deepshore/deeptalk</a:t>
+            </a:r>
+            <a:endParaRPr lang="de-DE" dirty="0"/>
+          </a:p>
+          <a:p>
+            <a:endParaRPr lang="de-DE" dirty="0"/>
+          </a:p>
+          <a:p>
+            <a:r>
+              <a:rPr lang="de-DE" b="1" dirty="0"/>
+              <a:t>Weiterführendes</a:t>
+            </a:r>
+          </a:p>
+          <a:p>
+            <a:r>
+              <a:rPr lang="de-DE" dirty="0" err="1"/>
+              <a:t>Postgres</a:t>
+            </a:r>
+            <a:r>
+              <a:rPr lang="de-DE" dirty="0"/>
+              <a:t>: </a:t>
+            </a:r>
+            <a:r>
+              <a:rPr lang="de-DE" dirty="0">
+                <a:hlinkClick r:id="rId4"/>
+              </a:rPr>
+              <a:t>https://www.postgresql.org/</a:t>
+            </a:r>
+            <a:endParaRPr lang="de-DE" dirty="0"/>
+          </a:p>
+          <a:p>
+            <a:r>
+              <a:rPr lang="de-DE" dirty="0" err="1"/>
+              <a:t>Grafana</a:t>
+            </a:r>
+            <a:r>
+              <a:rPr lang="de-DE" dirty="0"/>
+              <a:t>: </a:t>
+            </a:r>
+            <a:r>
+              <a:rPr lang="de-DE" dirty="0">
+                <a:sym typeface="Wingdings" pitchFamily="2" charset="2"/>
+                <a:hlinkClick r:id="rId5"/>
+              </a:rPr>
+              <a:t>https://grafana.com/docs/grafana/latest/administration/provisioning/</a:t>
+            </a:r>
+            <a:endParaRPr lang="de-DE" dirty="0">
+              <a:sym typeface="Wingdings" pitchFamily="2" charset="2"/>
+            </a:endParaRPr>
+          </a:p>
+          <a:p>
+            <a:r>
+              <a:rPr lang="de-DE" dirty="0" err="1"/>
+              <a:t>Kubernetes</a:t>
+            </a:r>
+            <a:r>
+              <a:rPr lang="de-DE" dirty="0"/>
+              <a:t>: </a:t>
+            </a:r>
+            <a:r>
+              <a:rPr lang="de-DE" dirty="0">
+                <a:hlinkClick r:id="rId6"/>
+              </a:rPr>
+              <a:t>https://kubernetes.io/docs/home/</a:t>
+            </a:r>
+            <a:endParaRPr lang="de-DE" dirty="0"/>
+          </a:p>
+          <a:p>
+            <a:endParaRPr lang="de-DE" dirty="0"/>
+          </a:p>
+          <a:p>
+            <a:r>
+              <a:rPr lang="de-DE" b="1" dirty="0"/>
+              <a:t>Feedback , Anregungen, Themenvorschläge</a:t>
+            </a:r>
+          </a:p>
+          <a:p>
+            <a:r>
+              <a:rPr lang="de-DE" dirty="0">
+                <a:hlinkClick r:id="rId7"/>
+              </a:rPr>
+              <a:t>florian.boldt@deepshore.de</a:t>
+            </a:r>
+            <a:endParaRPr lang="de-DE" dirty="0"/>
+          </a:p>
+          <a:p>
+            <a:r>
+              <a:rPr lang="de-DE" dirty="0">
+                <a:hlinkClick r:id="rId8"/>
+              </a:rPr>
+              <a:t>malte.groth@deepshore.de</a:t>
+            </a:r>
+            <a:endParaRPr lang="de-DE" dirty="0"/>
+          </a:p>
+          <a:p>
+            <a:r>
+              <a:rPr lang="de-DE" dirty="0">
+                <a:hlinkClick r:id="rId9"/>
+              </a:rPr>
+              <a:t>frederic.born@deepshore.de</a:t>
+            </a:r>
+            <a:endParaRPr lang="de-DE" dirty="0"/>
+          </a:p>
+          <a:p>
+            <a:endParaRPr lang="de-DE" dirty="0"/>
+          </a:p>
+          <a:p>
+            <a:endParaRPr lang="de-DE" dirty="0"/>
+          </a:p>
+          <a:p>
+            <a:endParaRPr lang="de-DE" dirty="0"/>
+          </a:p>
+        </p:txBody>
+      </p:sp>
+    </p:spTree>
+    <p:extLst>
+      <p:ext uri="{BB962C8B-B14F-4D97-AF65-F5344CB8AC3E}">
+        <p14:creationId xmlns:p14="http://schemas.microsoft.com/office/powerpoint/2010/main" val="1579135088"/>
+      </p:ext>
+    </p:extLst>
+  </p:cSld>
+  <p:clrMapOvr>
+    <a:masterClrMapping/>
+  </p:clrMapOvr>
+</p:sld>
+</file>
+
+<file path=ppt/slides/slide21.xml><?xml version="1.0" encoding="utf-8"?>
+<p:sld xmlns:a="http://schemas.openxmlformats.org/drawingml/2006/main" xmlns:r="http://schemas.openxmlformats.org/officeDocument/2006/relationships" xmlns:p="http://schemas.openxmlformats.org/presentationml/2006/main">
+  <p:cSld>
+    <p:spTree>
+      <p:nvGrpSpPr>
+        <p:cNvPr id="1" name=""/>
+        <p:cNvGrpSpPr/>
+        <p:nvPr/>
+      </p:nvGrpSpPr>
+      <p:grpSpPr>
+        <a:xfrm>
+          <a:off x="0" y="0"/>
+          <a:ext cx="0" cy="0"/>
+          <a:chOff x="0" y="0"/>
+          <a:chExt cx="0" cy="0"/>
+        </a:xfrm>
+      </p:grpSpPr>
+      <p:sp>
+        <p:nvSpPr>
+          <p:cNvPr id="2" name="Titel 1">
+            <a:extLst>
+              <a:ext uri="{FF2B5EF4-FFF2-40B4-BE49-F238E27FC236}">
                 <a16:creationId xmlns:a16="http://schemas.microsoft.com/office/drawing/2014/main" id="{693F10F7-6A72-7443-9D29-766F88D4FE7E}"/>
               </a:ext>
             </a:extLst>
@@ -9800,8 +10226,26 @@
         </p:nvSpPr>
         <p:spPr/>
         <p:txBody>
-          <a:bodyPr/>
+          <a:bodyPr>
+            <a:normAutofit/>
+          </a:bodyPr>
           <a:lstStyle/>
+          <a:p>
+            <a:pPr marL="360">
+              <a:spcBef>
+                <a:spcPts val="799"/>
+              </a:spcBef>
+            </a:pPr>
+            <a:r>
+              <a:rPr lang="de-DE" b="1" spc="-1" dirty="0">
+                <a:solidFill>
+                  <a:srgbClr val="000000"/>
+                </a:solidFill>
+                <a:latin typeface="Verdana"/>
+              </a:rPr>
+              <a:t>Problem</a:t>
+            </a:r>
+          </a:p>
           <a:p>
             <a:pPr marL="360">
               <a:spcBef>
@@ -9815,7 +10259,7 @@
                 </a:solidFill>
                 <a:latin typeface="Verdana"/>
               </a:rPr>
-              <a:t>Thema des nächsten </a:t>
+              <a:t>Daten sollen erhalten bleiben – </a:t>
             </a:r>
             <a:r>
               <a:rPr lang="de-DE" spc="-1" dirty="0" err="1">
@@ -9824,7 +10268,7 @@
                 </a:solidFill>
                 <a:latin typeface="Verdana"/>
               </a:rPr>
-              <a:t>Deeptalks</a:t>
+              <a:t>Pods</a:t>
             </a:r>
             <a:r>
               <a:rPr lang="de-DE" spc="-1" dirty="0">
@@ -9833,7 +10277,33 @@
                 </a:solidFill>
                 <a:latin typeface="Verdana"/>
               </a:rPr>
-              <a:t>: Persistenz in </a:t>
+              <a:t> sind aber flüchtig</a:t>
+            </a:r>
+          </a:p>
+          <a:p>
+            <a:pPr marL="360">
+              <a:spcBef>
+                <a:spcPts val="799"/>
+              </a:spcBef>
+            </a:pPr>
+            <a:r>
+              <a:rPr lang="de-DE" spc="-1" dirty="0">
+                <a:solidFill>
+                  <a:srgbClr val="000000"/>
+                </a:solidFill>
+                <a:latin typeface="Verdana"/>
+                <a:sym typeface="Wingdings" pitchFamily="2" charset="2"/>
+              </a:rPr>
+              <a:t> Thema: </a:t>
+            </a:r>
+            <a:r>
+              <a:rPr lang="de-DE" spc="-1" dirty="0">
+                <a:solidFill>
+                  <a:srgbClr val="000000"/>
+                </a:solidFill>
+                <a:latin typeface="Verdana"/>
+              </a:rPr>
+              <a:t>Persistenz in </a:t>
             </a:r>
             <a:r>
               <a:rPr lang="de-DE" spc="-1" dirty="0" err="1">
@@ -9919,7 +10389,38 @@
                 </a:solidFill>
                 <a:latin typeface="Verdana"/>
               </a:rPr>
-              <a:t>Datenbanken	</a:t>
+              <a:t>Datenbanken</a:t>
+            </a:r>
+          </a:p>
+          <a:p>
+            <a:pPr marL="286110" indent="-285750">
+              <a:spcBef>
+                <a:spcPts val="799"/>
+              </a:spcBef>
+              <a:buFont typeface="Arial" panose="020B0604020202020204" pitchFamily="34" charset="0"/>
+              <a:buChar char="•"/>
+            </a:pPr>
+            <a:endParaRPr lang="de-DE" spc="-1" dirty="0">
+              <a:solidFill>
+                <a:srgbClr val="000000"/>
+              </a:solidFill>
+              <a:latin typeface="Verdana"/>
+            </a:endParaRPr>
+          </a:p>
+          <a:p>
+            <a:pPr marL="360">
+              <a:spcBef>
+                <a:spcPts val="799"/>
+              </a:spcBef>
+            </a:pPr>
+            <a:r>
+              <a:rPr lang="de-DE" spc="-1" dirty="0">
+                <a:solidFill>
+                  <a:srgbClr val="000000"/>
+                </a:solidFill>
+                <a:latin typeface="Verdana"/>
+              </a:rPr>
+              <a:t>	</a:t>
             </a:r>
           </a:p>
           <a:p>
@@ -9976,7 +10477,7 @@
 </p:sld>
 </file>
 
-<file path=ppt/slides/slide21.xml><?xml version="1.0" encoding="utf-8"?>
+<file path=ppt/slides/slide22.xml><?xml version="1.0" encoding="utf-8"?>
 <p:sld xmlns:a="http://schemas.openxmlformats.org/drawingml/2006/main" xmlns:r="http://schemas.openxmlformats.org/officeDocument/2006/relationships" xmlns:p="http://schemas.openxmlformats.org/presentationml/2006/main">
   <p:cSld>
     <p:spTree>
@@ -10273,7 +10774,18 @@
           <a:p>
             <a:r>
               <a:rPr lang="de-DE" dirty="0"/>
-              <a:t>Grundlagen</a:t>
+              <a:t>Beispiel I:</a:t>
+            </a:r>
+            <a:br>
+              <a:rPr lang="de-DE" dirty="0"/>
+            </a:br>
+            <a:r>
+              <a:rPr lang="de-DE" dirty="0" err="1"/>
+              <a:t>Postgres</a:t>
+            </a:r>
+            <a:r>
+              <a:rPr lang="de-DE" dirty="0"/>
+              <a:t> konfigurieren</a:t>
             </a:r>
           </a:p>
         </p:txBody>

</xml_diff>